<commit_message>
Rechtschreibfehler in der Praesenation
</commit_message>
<xml_diff>
--- a/docs/Finalpresentation.pptx
+++ b/docs/Finalpresentation.pptx
@@ -202,7 +202,7 @@
           <a:p>
             <a:fld id="{F4DDCC6F-6543-44CD-B366-ACC94B098DFC}" type="datetimeFigureOut">
               <a:rPr lang="de-AT" smtClean="0"/>
-              <a:t>17.06.2013</a:t>
+              <a:t>18.06.2013</a:t>
             </a:fld>
             <a:endParaRPr lang="de-AT"/>
           </a:p>
@@ -730,7 +730,7 @@
           <a:p>
             <a:fld id="{7A87F95C-ABE2-411C-B435-A0C7FB9D6E09}" type="datetimeFigureOut">
               <a:rPr lang="de-AT" smtClean="0"/>
-              <a:t>17.06.2013</a:t>
+              <a:t>18.06.2013</a:t>
             </a:fld>
             <a:endParaRPr lang="de-AT"/>
           </a:p>
@@ -944,13 +944,13 @@
   <p:clrMapOvr>
     <a:masterClrMapping/>
   </p:clrMapOvr>
-  <mc:AlternateContent xmlns:mc="http://schemas.openxmlformats.org/markup-compatibility/2006">
-    <mc:Choice xmlns:p14="http://schemas.microsoft.com/office/powerpoint/2010/main" Requires="p14">
+  <mc:AlternateContent xmlns:mc="http://schemas.openxmlformats.org/markup-compatibility/2006" xmlns:p14="http://schemas.microsoft.com/office/powerpoint/2010/main">
+    <mc:Choice Requires="p14">
       <p:transition spd="med" p14:dur="700">
         <p:fade/>
       </p:transition>
     </mc:Choice>
-    <mc:Fallback>
+    <mc:Fallback xmlns="">
       <p:transition spd="med">
         <p:fade/>
       </p:transition>
@@ -1075,7 +1075,7 @@
           <a:p>
             <a:fld id="{7A87F95C-ABE2-411C-B435-A0C7FB9D6E09}" type="datetimeFigureOut">
               <a:rPr lang="de-AT" smtClean="0"/>
-              <a:t>17.06.2013</a:t>
+              <a:t>18.06.2013</a:t>
             </a:fld>
             <a:endParaRPr lang="de-AT"/>
           </a:p>
@@ -1128,13 +1128,13 @@
   <p:clrMapOvr>
     <a:masterClrMapping/>
   </p:clrMapOvr>
-  <mc:AlternateContent xmlns:mc="http://schemas.openxmlformats.org/markup-compatibility/2006">
-    <mc:Choice xmlns:p14="http://schemas.microsoft.com/office/powerpoint/2010/main" Requires="p14">
+  <mc:AlternateContent xmlns:mc="http://schemas.openxmlformats.org/markup-compatibility/2006" xmlns:p14="http://schemas.microsoft.com/office/powerpoint/2010/main">
+    <mc:Choice Requires="p14">
       <p:transition spd="med" p14:dur="700">
         <p:fade/>
       </p:transition>
     </mc:Choice>
-    <mc:Fallback>
+    <mc:Fallback xmlns="">
       <p:transition spd="med">
         <p:fade/>
       </p:transition>
@@ -1262,7 +1262,7 @@
           <a:p>
             <a:fld id="{7A87F95C-ABE2-411C-B435-A0C7FB9D6E09}" type="datetimeFigureOut">
               <a:rPr lang="de-AT" smtClean="0"/>
-              <a:t>17.06.2013</a:t>
+              <a:t>18.06.2013</a:t>
             </a:fld>
             <a:endParaRPr lang="de-AT"/>
           </a:p>
@@ -1315,13 +1315,13 @@
   <p:clrMapOvr>
     <a:masterClrMapping/>
   </p:clrMapOvr>
-  <mc:AlternateContent xmlns:mc="http://schemas.openxmlformats.org/markup-compatibility/2006">
-    <mc:Choice xmlns:p14="http://schemas.microsoft.com/office/powerpoint/2010/main" Requires="p14">
+  <mc:AlternateContent xmlns:mc="http://schemas.openxmlformats.org/markup-compatibility/2006" xmlns:p14="http://schemas.microsoft.com/office/powerpoint/2010/main">
+    <mc:Choice Requires="p14">
       <p:transition spd="med" p14:dur="700">
         <p:fade/>
       </p:transition>
     </mc:Choice>
-    <mc:Fallback>
+    <mc:Fallback xmlns="">
       <p:transition spd="med">
         <p:fade/>
       </p:transition>
@@ -1397,7 +1397,7 @@
           <a:p>
             <a:fld id="{7A87F95C-ABE2-411C-B435-A0C7FB9D6E09}" type="datetimeFigureOut">
               <a:rPr lang="de-AT" smtClean="0"/>
-              <a:t>17.06.2013</a:t>
+              <a:t>18.06.2013</a:t>
             </a:fld>
             <a:endParaRPr lang="de-AT"/>
           </a:p>
@@ -1517,13 +1517,13 @@
   <p:clrMapOvr>
     <a:masterClrMapping/>
   </p:clrMapOvr>
-  <mc:AlternateContent xmlns:mc="http://schemas.openxmlformats.org/markup-compatibility/2006">
-    <mc:Choice xmlns:p14="http://schemas.microsoft.com/office/powerpoint/2010/main" Requires="p14">
+  <mc:AlternateContent xmlns:mc="http://schemas.openxmlformats.org/markup-compatibility/2006" xmlns:p14="http://schemas.microsoft.com/office/powerpoint/2010/main">
+    <mc:Choice Requires="p14">
       <p:transition spd="med" p14:dur="700">
         <p:fade/>
       </p:transition>
     </mc:Choice>
-    <mc:Fallback>
+    <mc:Fallback xmlns="">
       <p:transition spd="med">
         <p:fade/>
       </p:transition>
@@ -1724,7 +1724,7 @@
           <a:p>
             <a:fld id="{7A87F95C-ABE2-411C-B435-A0C7FB9D6E09}" type="datetimeFigureOut">
               <a:rPr lang="de-AT" smtClean="0"/>
-              <a:t>17.06.2013</a:t>
+              <a:t>18.06.2013</a:t>
             </a:fld>
             <a:endParaRPr lang="de-AT"/>
           </a:p>
@@ -1777,13 +1777,13 @@
   <p:clrMapOvr>
     <a:masterClrMapping/>
   </p:clrMapOvr>
-  <mc:AlternateContent xmlns:mc="http://schemas.openxmlformats.org/markup-compatibility/2006">
-    <mc:Choice xmlns:p14="http://schemas.microsoft.com/office/powerpoint/2010/main" Requires="p14">
+  <mc:AlternateContent xmlns:mc="http://schemas.openxmlformats.org/markup-compatibility/2006" xmlns:p14="http://schemas.microsoft.com/office/powerpoint/2010/main">
+    <mc:Choice Requires="p14">
       <p:transition spd="med" p14:dur="700">
         <p:fade/>
       </p:transition>
     </mc:Choice>
-    <mc:Fallback>
+    <mc:Fallback xmlns="">
       <p:transition spd="med">
         <p:fade/>
       </p:transition>
@@ -2029,7 +2029,7 @@
           <a:p>
             <a:fld id="{7A87F95C-ABE2-411C-B435-A0C7FB9D6E09}" type="datetimeFigureOut">
               <a:rPr lang="de-AT" smtClean="0"/>
-              <a:t>17.06.2013</a:t>
+              <a:t>18.06.2013</a:t>
             </a:fld>
             <a:endParaRPr lang="de-AT"/>
           </a:p>
@@ -2082,13 +2082,13 @@
   <p:clrMapOvr>
     <a:masterClrMapping/>
   </p:clrMapOvr>
-  <mc:AlternateContent xmlns:mc="http://schemas.openxmlformats.org/markup-compatibility/2006">
-    <mc:Choice xmlns:p14="http://schemas.microsoft.com/office/powerpoint/2010/main" Requires="p14">
+  <mc:AlternateContent xmlns:mc="http://schemas.openxmlformats.org/markup-compatibility/2006" xmlns:p14="http://schemas.microsoft.com/office/powerpoint/2010/main">
+    <mc:Choice Requires="p14">
       <p:transition spd="med" p14:dur="700">
         <p:fade/>
       </p:transition>
     </mc:Choice>
-    <mc:Fallback>
+    <mc:Fallback xmlns="">
       <p:transition spd="med">
         <p:fade/>
       </p:transition>
@@ -2476,7 +2476,7 @@
           <a:p>
             <a:fld id="{7A87F95C-ABE2-411C-B435-A0C7FB9D6E09}" type="datetimeFigureOut">
               <a:rPr lang="de-AT" smtClean="0"/>
-              <a:t>17.06.2013</a:t>
+              <a:t>18.06.2013</a:t>
             </a:fld>
             <a:endParaRPr lang="de-AT"/>
           </a:p>
@@ -2529,13 +2529,13 @@
   <p:clrMapOvr>
     <a:masterClrMapping/>
   </p:clrMapOvr>
-  <mc:AlternateContent xmlns:mc="http://schemas.openxmlformats.org/markup-compatibility/2006">
-    <mc:Choice xmlns:p14="http://schemas.microsoft.com/office/powerpoint/2010/main" Requires="p14">
+  <mc:AlternateContent xmlns:mc="http://schemas.openxmlformats.org/markup-compatibility/2006" xmlns:p14="http://schemas.microsoft.com/office/powerpoint/2010/main">
+    <mc:Choice Requires="p14">
       <p:transition spd="med" p14:dur="700">
         <p:fade/>
       </p:transition>
     </mc:Choice>
-    <mc:Fallback>
+    <mc:Fallback xmlns="">
       <p:transition spd="med">
         <p:fade/>
       </p:transition>
@@ -2606,7 +2606,7 @@
           <a:p>
             <a:fld id="{7A87F95C-ABE2-411C-B435-A0C7FB9D6E09}" type="datetimeFigureOut">
               <a:rPr lang="de-AT" smtClean="0"/>
-              <a:t>17.06.2013</a:t>
+              <a:t>18.06.2013</a:t>
             </a:fld>
             <a:endParaRPr lang="de-AT"/>
           </a:p>
@@ -2659,13 +2659,13 @@
   <p:clrMapOvr>
     <a:masterClrMapping/>
   </p:clrMapOvr>
-  <mc:AlternateContent xmlns:mc="http://schemas.openxmlformats.org/markup-compatibility/2006">
-    <mc:Choice xmlns:p14="http://schemas.microsoft.com/office/powerpoint/2010/main" Requires="p14">
+  <mc:AlternateContent xmlns:mc="http://schemas.openxmlformats.org/markup-compatibility/2006" xmlns:p14="http://schemas.microsoft.com/office/powerpoint/2010/main">
+    <mc:Choice Requires="p14">
       <p:transition spd="med" p14:dur="700">
         <p:fade/>
       </p:transition>
     </mc:Choice>
-    <mc:Fallback>
+    <mc:Fallback xmlns="">
       <p:transition spd="med">
         <p:fade/>
       </p:transition>
@@ -2708,7 +2708,7 @@
           <a:p>
             <a:fld id="{7A87F95C-ABE2-411C-B435-A0C7FB9D6E09}" type="datetimeFigureOut">
               <a:rPr lang="de-AT" smtClean="0"/>
-              <a:t>17.06.2013</a:t>
+              <a:t>18.06.2013</a:t>
             </a:fld>
             <a:endParaRPr lang="de-AT"/>
           </a:p>
@@ -2761,13 +2761,13 @@
   <p:clrMapOvr>
     <a:masterClrMapping/>
   </p:clrMapOvr>
-  <mc:AlternateContent xmlns:mc="http://schemas.openxmlformats.org/markup-compatibility/2006">
-    <mc:Choice xmlns:p14="http://schemas.microsoft.com/office/powerpoint/2010/main" Requires="p14">
+  <mc:AlternateContent xmlns:mc="http://schemas.openxmlformats.org/markup-compatibility/2006" xmlns:p14="http://schemas.microsoft.com/office/powerpoint/2010/main">
+    <mc:Choice Requires="p14">
       <p:transition spd="med" p14:dur="700">
         <p:fade/>
       </p:transition>
     </mc:Choice>
-    <mc:Fallback>
+    <mc:Fallback xmlns="">
       <p:transition spd="med">
         <p:fade/>
       </p:transition>
@@ -2970,7 +2970,7 @@
           <a:p>
             <a:fld id="{7A87F95C-ABE2-411C-B435-A0C7FB9D6E09}" type="datetimeFigureOut">
               <a:rPr lang="de-AT" smtClean="0"/>
-              <a:t>17.06.2013</a:t>
+              <a:t>18.06.2013</a:t>
             </a:fld>
             <a:endParaRPr lang="de-AT"/>
           </a:p>
@@ -3023,13 +3023,13 @@
   <p:clrMapOvr>
     <a:masterClrMapping/>
   </p:clrMapOvr>
-  <mc:AlternateContent xmlns:mc="http://schemas.openxmlformats.org/markup-compatibility/2006">
-    <mc:Choice xmlns:p14="http://schemas.microsoft.com/office/powerpoint/2010/main" Requires="p14">
+  <mc:AlternateContent xmlns:mc="http://schemas.openxmlformats.org/markup-compatibility/2006" xmlns:p14="http://schemas.microsoft.com/office/powerpoint/2010/main">
+    <mc:Choice Requires="p14">
       <p:transition spd="med" p14:dur="700">
         <p:fade/>
       </p:transition>
     </mc:Choice>
-    <mc:Fallback>
+    <mc:Fallback xmlns="">
       <p:transition spd="med">
         <p:fade/>
       </p:transition>
@@ -3498,7 +3498,7 @@
           <a:p>
             <a:fld id="{7A87F95C-ABE2-411C-B435-A0C7FB9D6E09}" type="datetimeFigureOut">
               <a:rPr lang="de-AT" smtClean="0"/>
-              <a:t>17.06.2013</a:t>
+              <a:t>18.06.2013</a:t>
             </a:fld>
             <a:endParaRPr lang="de-AT"/>
           </a:p>
@@ -3551,13 +3551,13 @@
   <p:clrMapOvr>
     <a:masterClrMapping/>
   </p:clrMapOvr>
-  <mc:AlternateContent xmlns:mc="http://schemas.openxmlformats.org/markup-compatibility/2006">
-    <mc:Choice xmlns:p14="http://schemas.microsoft.com/office/powerpoint/2010/main" Requires="p14">
+  <mc:AlternateContent xmlns:mc="http://schemas.openxmlformats.org/markup-compatibility/2006" xmlns:p14="http://schemas.microsoft.com/office/powerpoint/2010/main">
+    <mc:Choice Requires="p14">
       <p:transition spd="med" p14:dur="700">
         <p:fade/>
       </p:transition>
     </mc:Choice>
-    <mc:Fallback>
+    <mc:Fallback xmlns="">
       <p:transition spd="med">
         <p:fade/>
       </p:transition>
@@ -3725,7 +3725,7 @@
           <a:p>
             <a:fld id="{7A87F95C-ABE2-411C-B435-A0C7FB9D6E09}" type="datetimeFigureOut">
               <a:rPr lang="de-AT" smtClean="0"/>
-              <a:t>17.06.2013</a:t>
+              <a:t>18.06.2013</a:t>
             </a:fld>
             <a:endParaRPr lang="de-AT"/>
           </a:p>
@@ -3821,13 +3821,13 @@
     <p:sldLayoutId id="2147483670" r:id="rId10"/>
     <p:sldLayoutId id="2147483671" r:id="rId11"/>
   </p:sldLayoutIdLst>
-  <mc:AlternateContent xmlns:mc="http://schemas.openxmlformats.org/markup-compatibility/2006">
-    <mc:Choice xmlns:p14="http://schemas.microsoft.com/office/powerpoint/2010/main" Requires="p14">
+  <mc:AlternateContent xmlns:mc="http://schemas.openxmlformats.org/markup-compatibility/2006" xmlns:p14="http://schemas.microsoft.com/office/powerpoint/2010/main">
+    <mc:Choice Requires="p14">
       <p:transition spd="med" p14:dur="700">
         <p:fade/>
       </p:transition>
     </mc:Choice>
-    <mc:Fallback>
+    <mc:Fallback xmlns="">
       <p:transition spd="med">
         <p:fade/>
       </p:transition>
@@ -4287,13 +4287,13 @@
   <p:clrMapOvr>
     <a:masterClrMapping/>
   </p:clrMapOvr>
-  <mc:AlternateContent xmlns:mc="http://schemas.openxmlformats.org/markup-compatibility/2006">
-    <mc:Choice xmlns:p14="http://schemas.microsoft.com/office/powerpoint/2010/main" Requires="p14">
+  <mc:AlternateContent xmlns:mc="http://schemas.openxmlformats.org/markup-compatibility/2006" xmlns:p14="http://schemas.microsoft.com/office/powerpoint/2010/main">
+    <mc:Choice Requires="p14">
       <p:transition spd="med" p14:dur="700">
         <p:fade/>
       </p:transition>
     </mc:Choice>
-    <mc:Fallback>
+    <mc:Fallback xmlns="">
       <p:transition spd="med">
         <p:fade/>
       </p:transition>
@@ -4429,13 +4429,13 @@
   <p:clrMapOvr>
     <a:masterClrMapping/>
   </p:clrMapOvr>
-  <mc:AlternateContent xmlns:mc="http://schemas.openxmlformats.org/markup-compatibility/2006">
-    <mc:Choice xmlns:p14="http://schemas.microsoft.com/office/powerpoint/2010/main" Requires="p14">
+  <mc:AlternateContent xmlns:mc="http://schemas.openxmlformats.org/markup-compatibility/2006" xmlns:p14="http://schemas.microsoft.com/office/powerpoint/2010/main">
+    <mc:Choice Requires="p14">
       <p:transition spd="med" p14:dur="700">
         <p:fade/>
       </p:transition>
     </mc:Choice>
-    <mc:Fallback>
+    <mc:Fallback xmlns="">
       <p:transition spd="med">
         <p:fade/>
       </p:transition>
@@ -4518,22 +4518,22 @@
             </a:r>
             <a:r>
               <a:rPr lang="de-AT" dirty="0" smtClean="0"/>
-              <a:t> Session reicht of</a:t>
-            </a:r>
-            <a:r>
-              <a:rPr lang="de-AT" dirty="0" smtClean="0"/>
-              <a:t>t nicht </a:t>
+              <a:t> Session reicht oft nicht </a:t>
             </a:r>
           </a:p>
           <a:p>
             <a:pPr lvl="1"/>
             <a:r>
               <a:rPr lang="de-AT" dirty="0" smtClean="0"/>
-              <a:t>Interrupts werden nicht </a:t>
-            </a:r>
-            <a:r>
-              <a:rPr lang="de-AT" dirty="0" err="1" smtClean="0"/>
-              <a:t>zurückgsetzt</a:t>
+              <a:t>Interrupts werden </a:t>
+            </a:r>
+            <a:r>
+              <a:rPr lang="de-AT" smtClean="0"/>
+              <a:t>nicht </a:t>
+            </a:r>
+            <a:r>
+              <a:rPr lang="de-AT" smtClean="0"/>
+              <a:t>zurückgesetzt</a:t>
             </a:r>
             <a:endParaRPr lang="de-AT" dirty="0" smtClean="0"/>
           </a:p>
@@ -4587,7 +4587,6 @@
               <a:rPr lang="de-AT" dirty="0" smtClean="0"/>
               <a:t>Öfters kann der Kontext nicht wiederhergestellt werden (JTAG?)</a:t>
             </a:r>
-            <a:endParaRPr lang="de-AT" dirty="0" smtClean="0"/>
           </a:p>
           <a:p>
             <a:r>
@@ -4620,13 +4619,13 @@
   <p:clrMapOvr>
     <a:masterClrMapping/>
   </p:clrMapOvr>
-  <mc:AlternateContent xmlns:mc="http://schemas.openxmlformats.org/markup-compatibility/2006">
-    <mc:Choice xmlns:p14="http://schemas.microsoft.com/office/powerpoint/2010/main" Requires="p14">
+  <mc:AlternateContent xmlns:mc="http://schemas.openxmlformats.org/markup-compatibility/2006" xmlns:p14="http://schemas.microsoft.com/office/powerpoint/2010/main">
+    <mc:Choice Requires="p14">
       <p:transition spd="med" p14:dur="700">
         <p:fade/>
       </p:transition>
     </mc:Choice>
-    <mc:Fallback>
+    <mc:Fallback xmlns="">
       <p:transition spd="med">
         <p:fade/>
       </p:transition>
@@ -4744,13 +4743,13 @@
   <p:clrMapOvr>
     <a:masterClrMapping/>
   </p:clrMapOvr>
-  <mc:AlternateContent xmlns:mc="http://schemas.openxmlformats.org/markup-compatibility/2006">
-    <mc:Choice xmlns:p14="http://schemas.microsoft.com/office/powerpoint/2010/main" Requires="p14">
+  <mc:AlternateContent xmlns:mc="http://schemas.openxmlformats.org/markup-compatibility/2006" xmlns:p14="http://schemas.microsoft.com/office/powerpoint/2010/main">
+    <mc:Choice Requires="p14">
       <p:transition spd="med" p14:dur="700">
         <p:fade/>
       </p:transition>
     </mc:Choice>
-    <mc:Fallback>
+    <mc:Fallback xmlns="">
       <p:transition spd="med">
         <p:fade/>
       </p:transition>
@@ -5090,13 +5089,13 @@
   <p:clrMapOvr>
     <a:masterClrMapping/>
   </p:clrMapOvr>
-  <mc:AlternateContent xmlns:mc="http://schemas.openxmlformats.org/markup-compatibility/2006">
-    <mc:Choice xmlns:p14="http://schemas.microsoft.com/office/powerpoint/2010/main" Requires="p14">
+  <mc:AlternateContent xmlns:mc="http://schemas.openxmlformats.org/markup-compatibility/2006" xmlns:p14="http://schemas.microsoft.com/office/powerpoint/2010/main">
+    <mc:Choice Requires="p14">
       <p:transition spd="med" p14:dur="700">
         <p:fade/>
       </p:transition>
     </mc:Choice>
-    <mc:Fallback>
+    <mc:Fallback xmlns="">
       <p:transition spd="med">
         <p:fade/>
       </p:transition>
@@ -5268,7 +5267,6 @@
               <a:rPr lang="de-AT" dirty="0" smtClean="0"/>
               <a:t>GPIO</a:t>
             </a:r>
-            <a:endParaRPr lang="de-AT" dirty="0" smtClean="0"/>
           </a:p>
           <a:p>
             <a:pPr lvl="1"/>
@@ -5395,13 +5393,13 @@
   <p:clrMapOvr>
     <a:masterClrMapping/>
   </p:clrMapOvr>
-  <mc:AlternateContent xmlns:mc="http://schemas.openxmlformats.org/markup-compatibility/2006">
-    <mc:Choice xmlns:p14="http://schemas.microsoft.com/office/powerpoint/2010/main" Requires="p14">
+  <mc:AlternateContent xmlns:mc="http://schemas.openxmlformats.org/markup-compatibility/2006" xmlns:p14="http://schemas.microsoft.com/office/powerpoint/2010/main">
+    <mc:Choice Requires="p14">
       <p:transition spd="med" p14:dur="700">
         <p:fade/>
       </p:transition>
     </mc:Choice>
-    <mc:Fallback>
+    <mc:Fallback xmlns="">
       <p:transition spd="med">
         <p:fade/>
       </p:transition>
@@ -5567,13 +5565,13 @@
   <p:clrMapOvr>
     <a:masterClrMapping/>
   </p:clrMapOvr>
-  <mc:AlternateContent xmlns:mc="http://schemas.openxmlformats.org/markup-compatibility/2006">
-    <mc:Choice xmlns:p14="http://schemas.microsoft.com/office/powerpoint/2010/main" Requires="p14">
+  <mc:AlternateContent xmlns:mc="http://schemas.openxmlformats.org/markup-compatibility/2006" xmlns:p14="http://schemas.microsoft.com/office/powerpoint/2010/main">
+    <mc:Choice Requires="p14">
       <p:transition spd="med" p14:dur="700">
         <p:fade/>
       </p:transition>
     </mc:Choice>
-    <mc:Fallback>
+    <mc:Fallback xmlns="">
       <p:transition spd="med">
         <p:fade/>
       </p:transition>
@@ -5733,13 +5731,13 @@
   <p:clrMapOvr>
     <a:masterClrMapping/>
   </p:clrMapOvr>
-  <mc:AlternateContent xmlns:mc="http://schemas.openxmlformats.org/markup-compatibility/2006">
-    <mc:Choice xmlns:p14="http://schemas.microsoft.com/office/powerpoint/2010/main" Requires="p14">
+  <mc:AlternateContent xmlns:mc="http://schemas.openxmlformats.org/markup-compatibility/2006" xmlns:p14="http://schemas.microsoft.com/office/powerpoint/2010/main">
+    <mc:Choice Requires="p14">
       <p:transition spd="med" p14:dur="700">
         <p:fade/>
       </p:transition>
     </mc:Choice>
-    <mc:Fallback>
+    <mc:Fallback xmlns="">
       <p:transition spd="med">
         <p:fade/>
       </p:transition>
@@ -5996,13 +5994,13 @@
   <p:clrMapOvr>
     <a:masterClrMapping/>
   </p:clrMapOvr>
-  <mc:AlternateContent xmlns:mc="http://schemas.openxmlformats.org/markup-compatibility/2006">
-    <mc:Choice xmlns:p14="http://schemas.microsoft.com/office/powerpoint/2010/main" Requires="p14">
+  <mc:AlternateContent xmlns:mc="http://schemas.openxmlformats.org/markup-compatibility/2006" xmlns:p14="http://schemas.microsoft.com/office/powerpoint/2010/main">
+    <mc:Choice Requires="p14">
       <p:transition spd="med" p14:dur="700">
         <p:fade/>
       </p:transition>
     </mc:Choice>
-    <mc:Fallback>
+    <mc:Fallback xmlns="">
       <p:transition spd="med">
         <p:fade/>
       </p:transition>
@@ -6111,13 +6109,13 @@
   <p:clrMapOvr>
     <a:masterClrMapping/>
   </p:clrMapOvr>
-  <mc:AlternateContent xmlns:mc="http://schemas.openxmlformats.org/markup-compatibility/2006">
-    <mc:Choice xmlns:p14="http://schemas.microsoft.com/office/powerpoint/2010/main" Requires="p14">
+  <mc:AlternateContent xmlns:mc="http://schemas.openxmlformats.org/markup-compatibility/2006" xmlns:p14="http://schemas.microsoft.com/office/powerpoint/2010/main">
+    <mc:Choice Requires="p14">
       <p:transition spd="med" p14:dur="700">
         <p:fade/>
       </p:transition>
     </mc:Choice>
-    <mc:Fallback>
+    <mc:Fallback xmlns="">
       <p:transition spd="med">
         <p:fade/>
       </p:transition>
@@ -6247,13 +6245,13 @@
   <p:clrMapOvr>
     <a:masterClrMapping/>
   </p:clrMapOvr>
-  <mc:AlternateContent xmlns:mc="http://schemas.openxmlformats.org/markup-compatibility/2006">
-    <mc:Choice xmlns:p14="http://schemas.microsoft.com/office/powerpoint/2010/main" Requires="p14">
+  <mc:AlternateContent xmlns:mc="http://schemas.openxmlformats.org/markup-compatibility/2006" xmlns:p14="http://schemas.microsoft.com/office/powerpoint/2010/main">
+    <mc:Choice Requires="p14">
       <p:transition spd="med" p14:dur="700">
         <p:fade/>
       </p:transition>
     </mc:Choice>
-    <mc:Fallback>
+    <mc:Fallback xmlns="">
       <p:transition spd="med">
         <p:fade/>
       </p:transition>

</xml_diff>

<commit_message>
simple hello world running
</commit_message>
<xml_diff>
--- a/docs/Finalpresentation.pptx
+++ b/docs/Finalpresentation.pptx
@@ -5,7 +5,7 @@
     <p:sldMasterId id="2147483660" r:id="rId1"/>
   </p:sldMasterIdLst>
   <p:notesMasterIdLst>
-    <p:notesMasterId r:id="rId13"/>
+    <p:notesMasterId r:id="rId16"/>
   </p:notesMasterIdLst>
   <p:sldIdLst>
     <p:sldId id="256" r:id="rId2"/>
@@ -13,12 +13,15 @@
     <p:sldId id="260" r:id="rId4"/>
     <p:sldId id="257" r:id="rId5"/>
     <p:sldId id="261" r:id="rId6"/>
-    <p:sldId id="262" r:id="rId7"/>
-    <p:sldId id="263" r:id="rId8"/>
-    <p:sldId id="265" r:id="rId9"/>
-    <p:sldId id="264" r:id="rId10"/>
-    <p:sldId id="266" r:id="rId11"/>
-    <p:sldId id="267" r:id="rId12"/>
+    <p:sldId id="265" r:id="rId7"/>
+    <p:sldId id="268" r:id="rId8"/>
+    <p:sldId id="262" r:id="rId9"/>
+    <p:sldId id="263" r:id="rId10"/>
+    <p:sldId id="270" r:id="rId11"/>
+    <p:sldId id="264" r:id="rId12"/>
+    <p:sldId id="266" r:id="rId13"/>
+    <p:sldId id="267" r:id="rId14"/>
+    <p:sldId id="269" r:id="rId15"/>
   </p:sldIdLst>
   <p:sldSz cx="9144000" cy="6858000" type="screen4x3"/>
   <p:notesSz cx="6858000" cy="9144000"/>
@@ -202,7 +205,7 @@
           <a:p>
             <a:fld id="{F4DDCC6F-6543-44CD-B366-ACC94B098DFC}" type="datetimeFigureOut">
               <a:rPr lang="de-AT" smtClean="0"/>
-              <a:t>18.06.2013</a:t>
+              <a:t>20.06.2013</a:t>
             </a:fld>
             <a:endParaRPr lang="de-AT"/>
           </a:p>
@@ -515,12 +518,8 @@
           <a:lstStyle/>
           <a:p>
             <a:r>
-              <a:rPr lang="de-AT" dirty="0" smtClean="0"/>
-              <a:t>MMU ist zwar implementiert, der Sprung zum Prozess</a:t>
-            </a:r>
-            <a:r>
-              <a:rPr lang="de-AT" baseline="0" dirty="0" smtClean="0"/>
-              <a:t> klappt jedoch nicht. </a:t>
+              <a:rPr lang="de-AT" dirty="0" err="1" smtClean="0"/>
+              <a:t>Morti</a:t>
             </a:r>
             <a:endParaRPr lang="de-AT" dirty="0"/>
           </a:p>
@@ -543,7 +542,7 @@
           <a:p>
             <a:fld id="{D9823AE5-66C5-4B88-BD88-B0517FC31F87}" type="slidenum">
               <a:rPr lang="de-AT" smtClean="0"/>
-              <a:t>4</a:t>
+              <a:t>1</a:t>
             </a:fld>
             <a:endParaRPr lang="de-AT"/>
           </a:p>
@@ -552,7 +551,523 @@
     </p:spTree>
     <p:extLst>
       <p:ext uri="{BB962C8B-B14F-4D97-AF65-F5344CB8AC3E}">
-        <p14:creationId xmlns:p14="http://schemas.microsoft.com/office/powerpoint/2010/main" val="2224154810"/>
+        <p14:creationId xmlns:p14="http://schemas.microsoft.com/office/powerpoint/2010/main" val="1015970152"/>
+      </p:ext>
+    </p:extLst>
+  </p:cSld>
+  <p:clrMapOvr>
+    <a:masterClrMapping/>
+  </p:clrMapOvr>
+</p:notes>
+</file>
+
+<file path=ppt/notesSlides/notesSlide10.xml><?xml version="1.0" encoding="utf-8"?>
+<p:notes xmlns:a="http://schemas.openxmlformats.org/drawingml/2006/main" xmlns:r="http://schemas.openxmlformats.org/officeDocument/2006/relationships" xmlns:p="http://schemas.openxmlformats.org/presentationml/2006/main">
+  <p:cSld>
+    <p:spTree>
+      <p:nvGrpSpPr>
+        <p:cNvPr id="1" name=""/>
+        <p:cNvGrpSpPr/>
+        <p:nvPr/>
+      </p:nvGrpSpPr>
+      <p:grpSpPr>
+        <a:xfrm>
+          <a:off x="0" y="0"/>
+          <a:ext cx="0" cy="0"/>
+          <a:chOff x="0" y="0"/>
+          <a:chExt cx="0" cy="0"/>
+        </a:xfrm>
+      </p:grpSpPr>
+      <p:sp>
+        <p:nvSpPr>
+          <p:cNvPr id="2" name="Folienbildplatzhalter 1"/>
+          <p:cNvSpPr>
+            <a:spLocks noGrp="1" noRot="1" noChangeAspect="1"/>
+          </p:cNvSpPr>
+          <p:nvPr>
+            <p:ph type="sldImg"/>
+          </p:nvPr>
+        </p:nvSpPr>
+        <p:spPr/>
+      </p:sp>
+      <p:sp>
+        <p:nvSpPr>
+          <p:cNvPr id="3" name="Notizenplatzhalter 2"/>
+          <p:cNvSpPr>
+            <a:spLocks noGrp="1"/>
+          </p:cNvSpPr>
+          <p:nvPr>
+            <p:ph type="body" idx="1"/>
+          </p:nvPr>
+        </p:nvSpPr>
+        <p:spPr/>
+        <p:txBody>
+          <a:bodyPr/>
+          <a:lstStyle/>
+          <a:p>
+            <a:pPr marL="0" marR="0" indent="0" algn="l" defTabSz="914400" rtl="0" eaLnBrk="1" fontAlgn="auto" latinLnBrk="0" hangingPunct="1">
+              <a:lnSpc>
+                <a:spcPct val="100000"/>
+              </a:lnSpc>
+              <a:spcBef>
+                <a:spcPts val="0"/>
+              </a:spcBef>
+              <a:spcAft>
+                <a:spcPts val="0"/>
+              </a:spcAft>
+              <a:buClrTx/>
+              <a:buSzTx/>
+              <a:buFontTx/>
+              <a:buNone/>
+              <a:tabLst/>
+              <a:defRPr/>
+            </a:pPr>
+            <a:r>
+              <a:rPr lang="de-AT" dirty="0" smtClean="0"/>
+              <a:t>Manuel</a:t>
+            </a:r>
+          </a:p>
+          <a:p>
+            <a:endParaRPr lang="de-AT" dirty="0"/>
+          </a:p>
+        </p:txBody>
+      </p:sp>
+      <p:sp>
+        <p:nvSpPr>
+          <p:cNvPr id="4" name="Foliennummernplatzhalter 3"/>
+          <p:cNvSpPr>
+            <a:spLocks noGrp="1"/>
+          </p:cNvSpPr>
+          <p:nvPr>
+            <p:ph type="sldNum" sz="quarter" idx="10"/>
+          </p:nvPr>
+        </p:nvSpPr>
+        <p:spPr/>
+        <p:txBody>
+          <a:bodyPr/>
+          <a:lstStyle/>
+          <a:p>
+            <a:fld id="{D9823AE5-66C5-4B88-BD88-B0517FC31F87}" type="slidenum">
+              <a:rPr lang="de-AT" smtClean="0"/>
+              <a:t>10</a:t>
+            </a:fld>
+            <a:endParaRPr lang="de-AT"/>
+          </a:p>
+        </p:txBody>
+      </p:sp>
+    </p:spTree>
+    <p:extLst>
+      <p:ext uri="{BB962C8B-B14F-4D97-AF65-F5344CB8AC3E}">
+        <p14:creationId xmlns:p14="http://schemas.microsoft.com/office/powerpoint/2010/main" val="3620988103"/>
+      </p:ext>
+    </p:extLst>
+  </p:cSld>
+  <p:clrMapOvr>
+    <a:masterClrMapping/>
+  </p:clrMapOvr>
+</p:notes>
+</file>
+
+<file path=ppt/notesSlides/notesSlide11.xml><?xml version="1.0" encoding="utf-8"?>
+<p:notes xmlns:a="http://schemas.openxmlformats.org/drawingml/2006/main" xmlns:r="http://schemas.openxmlformats.org/officeDocument/2006/relationships" xmlns:p="http://schemas.openxmlformats.org/presentationml/2006/main">
+  <p:cSld>
+    <p:spTree>
+      <p:nvGrpSpPr>
+        <p:cNvPr id="1" name=""/>
+        <p:cNvGrpSpPr/>
+        <p:nvPr/>
+      </p:nvGrpSpPr>
+      <p:grpSpPr>
+        <a:xfrm>
+          <a:off x="0" y="0"/>
+          <a:ext cx="0" cy="0"/>
+          <a:chOff x="0" y="0"/>
+          <a:chExt cx="0" cy="0"/>
+        </a:xfrm>
+      </p:grpSpPr>
+      <p:sp>
+        <p:nvSpPr>
+          <p:cNvPr id="2" name="Folienbildplatzhalter 1"/>
+          <p:cNvSpPr>
+            <a:spLocks noGrp="1" noRot="1" noChangeAspect="1"/>
+          </p:cNvSpPr>
+          <p:nvPr>
+            <p:ph type="sldImg"/>
+          </p:nvPr>
+        </p:nvSpPr>
+        <p:spPr/>
+      </p:sp>
+      <p:sp>
+        <p:nvSpPr>
+          <p:cNvPr id="3" name="Notizenplatzhalter 2"/>
+          <p:cNvSpPr>
+            <a:spLocks noGrp="1"/>
+          </p:cNvSpPr>
+          <p:nvPr>
+            <p:ph type="body" idx="1"/>
+          </p:nvPr>
+        </p:nvSpPr>
+        <p:spPr/>
+        <p:txBody>
+          <a:bodyPr/>
+          <a:lstStyle/>
+          <a:p>
+            <a:r>
+              <a:rPr lang="de-AT" dirty="0" smtClean="0"/>
+              <a:t>KU</a:t>
+            </a:r>
+            <a:endParaRPr lang="de-AT" dirty="0"/>
+          </a:p>
+        </p:txBody>
+      </p:sp>
+      <p:sp>
+        <p:nvSpPr>
+          <p:cNvPr id="4" name="Foliennummernplatzhalter 3"/>
+          <p:cNvSpPr>
+            <a:spLocks noGrp="1"/>
+          </p:cNvSpPr>
+          <p:nvPr>
+            <p:ph type="sldNum" sz="quarter" idx="10"/>
+          </p:nvPr>
+        </p:nvSpPr>
+        <p:spPr/>
+        <p:txBody>
+          <a:bodyPr/>
+          <a:lstStyle/>
+          <a:p>
+            <a:fld id="{D9823AE5-66C5-4B88-BD88-B0517FC31F87}" type="slidenum">
+              <a:rPr lang="de-AT" smtClean="0"/>
+              <a:t>11</a:t>
+            </a:fld>
+            <a:endParaRPr lang="de-AT"/>
+          </a:p>
+        </p:txBody>
+      </p:sp>
+    </p:spTree>
+    <p:extLst>
+      <p:ext uri="{BB962C8B-B14F-4D97-AF65-F5344CB8AC3E}">
+        <p14:creationId xmlns:p14="http://schemas.microsoft.com/office/powerpoint/2010/main" val="2596671266"/>
+      </p:ext>
+    </p:extLst>
+  </p:cSld>
+  <p:clrMapOvr>
+    <a:masterClrMapping/>
+  </p:clrMapOvr>
+</p:notes>
+</file>
+
+<file path=ppt/notesSlides/notesSlide12.xml><?xml version="1.0" encoding="utf-8"?>
+<p:notes xmlns:a="http://schemas.openxmlformats.org/drawingml/2006/main" xmlns:r="http://schemas.openxmlformats.org/officeDocument/2006/relationships" xmlns:p="http://schemas.openxmlformats.org/presentationml/2006/main">
+  <p:cSld>
+    <p:spTree>
+      <p:nvGrpSpPr>
+        <p:cNvPr id="1" name=""/>
+        <p:cNvGrpSpPr/>
+        <p:nvPr/>
+      </p:nvGrpSpPr>
+      <p:grpSpPr>
+        <a:xfrm>
+          <a:off x="0" y="0"/>
+          <a:ext cx="0" cy="0"/>
+          <a:chOff x="0" y="0"/>
+          <a:chExt cx="0" cy="0"/>
+        </a:xfrm>
+      </p:grpSpPr>
+      <p:sp>
+        <p:nvSpPr>
+          <p:cNvPr id="2" name="Folienbildplatzhalter 1"/>
+          <p:cNvSpPr>
+            <a:spLocks noGrp="1" noRot="1" noChangeAspect="1"/>
+          </p:cNvSpPr>
+          <p:nvPr>
+            <p:ph type="sldImg"/>
+          </p:nvPr>
+        </p:nvSpPr>
+        <p:spPr/>
+      </p:sp>
+      <p:sp>
+        <p:nvSpPr>
+          <p:cNvPr id="3" name="Notizenplatzhalter 2"/>
+          <p:cNvSpPr>
+            <a:spLocks noGrp="1"/>
+          </p:cNvSpPr>
+          <p:nvPr>
+            <p:ph type="body" idx="1"/>
+          </p:nvPr>
+        </p:nvSpPr>
+        <p:spPr/>
+        <p:txBody>
+          <a:bodyPr/>
+          <a:lstStyle/>
+          <a:p>
+            <a:pPr marL="0" marR="0" indent="0" algn="l" defTabSz="914400" rtl="0" eaLnBrk="1" fontAlgn="auto" latinLnBrk="0" hangingPunct="1">
+              <a:lnSpc>
+                <a:spcPct val="100000"/>
+              </a:lnSpc>
+              <a:spcBef>
+                <a:spcPts val="0"/>
+              </a:spcBef>
+              <a:spcAft>
+                <a:spcPts val="0"/>
+              </a:spcAft>
+              <a:buClrTx/>
+              <a:buSzTx/>
+              <a:buFontTx/>
+              <a:buNone/>
+              <a:tabLst/>
+              <a:defRPr/>
+            </a:pPr>
+            <a:r>
+              <a:rPr lang="de-AT" dirty="0" smtClean="0"/>
+              <a:t>KU</a:t>
+            </a:r>
+          </a:p>
+          <a:p>
+            <a:endParaRPr lang="de-AT" dirty="0"/>
+          </a:p>
+        </p:txBody>
+      </p:sp>
+      <p:sp>
+        <p:nvSpPr>
+          <p:cNvPr id="4" name="Foliennummernplatzhalter 3"/>
+          <p:cNvSpPr>
+            <a:spLocks noGrp="1"/>
+          </p:cNvSpPr>
+          <p:nvPr>
+            <p:ph type="sldNum" sz="quarter" idx="10"/>
+          </p:nvPr>
+        </p:nvSpPr>
+        <p:spPr/>
+        <p:txBody>
+          <a:bodyPr/>
+          <a:lstStyle/>
+          <a:p>
+            <a:fld id="{D9823AE5-66C5-4B88-BD88-B0517FC31F87}" type="slidenum">
+              <a:rPr lang="de-AT" smtClean="0"/>
+              <a:t>12</a:t>
+            </a:fld>
+            <a:endParaRPr lang="de-AT"/>
+          </a:p>
+        </p:txBody>
+      </p:sp>
+    </p:spTree>
+    <p:extLst>
+      <p:ext uri="{BB962C8B-B14F-4D97-AF65-F5344CB8AC3E}">
+        <p14:creationId xmlns:p14="http://schemas.microsoft.com/office/powerpoint/2010/main" val="2855398007"/>
+      </p:ext>
+    </p:extLst>
+  </p:cSld>
+  <p:clrMapOvr>
+    <a:masterClrMapping/>
+  </p:clrMapOvr>
+</p:notes>
+</file>
+
+<file path=ppt/notesSlides/notesSlide13.xml><?xml version="1.0" encoding="utf-8"?>
+<p:notes xmlns:a="http://schemas.openxmlformats.org/drawingml/2006/main" xmlns:r="http://schemas.openxmlformats.org/officeDocument/2006/relationships" xmlns:p="http://schemas.openxmlformats.org/presentationml/2006/main">
+  <p:cSld>
+    <p:spTree>
+      <p:nvGrpSpPr>
+        <p:cNvPr id="1" name=""/>
+        <p:cNvGrpSpPr/>
+        <p:nvPr/>
+      </p:nvGrpSpPr>
+      <p:grpSpPr>
+        <a:xfrm>
+          <a:off x="0" y="0"/>
+          <a:ext cx="0" cy="0"/>
+          <a:chOff x="0" y="0"/>
+          <a:chExt cx="0" cy="0"/>
+        </a:xfrm>
+      </p:grpSpPr>
+      <p:sp>
+        <p:nvSpPr>
+          <p:cNvPr id="2" name="Folienbildplatzhalter 1"/>
+          <p:cNvSpPr>
+            <a:spLocks noGrp="1" noRot="1" noChangeAspect="1"/>
+          </p:cNvSpPr>
+          <p:nvPr>
+            <p:ph type="sldImg"/>
+          </p:nvPr>
+        </p:nvSpPr>
+        <p:spPr/>
+      </p:sp>
+      <p:sp>
+        <p:nvSpPr>
+          <p:cNvPr id="3" name="Notizenplatzhalter 2"/>
+          <p:cNvSpPr>
+            <a:spLocks noGrp="1"/>
+          </p:cNvSpPr>
+          <p:nvPr>
+            <p:ph type="body" idx="1"/>
+          </p:nvPr>
+        </p:nvSpPr>
+        <p:spPr/>
+        <p:txBody>
+          <a:bodyPr/>
+          <a:lstStyle/>
+          <a:p>
+            <a:pPr marL="0" marR="0" indent="0" algn="l" defTabSz="914400" rtl="0" eaLnBrk="1" fontAlgn="auto" latinLnBrk="0" hangingPunct="1">
+              <a:lnSpc>
+                <a:spcPct val="100000"/>
+              </a:lnSpc>
+              <a:spcBef>
+                <a:spcPts val="0"/>
+              </a:spcBef>
+              <a:spcAft>
+                <a:spcPts val="0"/>
+              </a:spcAft>
+              <a:buClrTx/>
+              <a:buSzTx/>
+              <a:buFontTx/>
+              <a:buNone/>
+              <a:tabLst/>
+              <a:defRPr/>
+            </a:pPr>
+            <a:r>
+              <a:rPr lang="de-AT" dirty="0" smtClean="0"/>
+              <a:t>KU</a:t>
+            </a:r>
+          </a:p>
+          <a:p>
+            <a:endParaRPr lang="de-AT" dirty="0"/>
+          </a:p>
+        </p:txBody>
+      </p:sp>
+      <p:sp>
+        <p:nvSpPr>
+          <p:cNvPr id="4" name="Foliennummernplatzhalter 3"/>
+          <p:cNvSpPr>
+            <a:spLocks noGrp="1"/>
+          </p:cNvSpPr>
+          <p:nvPr>
+            <p:ph type="sldNum" sz="quarter" idx="10"/>
+          </p:nvPr>
+        </p:nvSpPr>
+        <p:spPr/>
+        <p:txBody>
+          <a:bodyPr/>
+          <a:lstStyle/>
+          <a:p>
+            <a:fld id="{D9823AE5-66C5-4B88-BD88-B0517FC31F87}" type="slidenum">
+              <a:rPr lang="de-AT" smtClean="0"/>
+              <a:t>13</a:t>
+            </a:fld>
+            <a:endParaRPr lang="de-AT"/>
+          </a:p>
+        </p:txBody>
+      </p:sp>
+    </p:spTree>
+    <p:extLst>
+      <p:ext uri="{BB962C8B-B14F-4D97-AF65-F5344CB8AC3E}">
+        <p14:creationId xmlns:p14="http://schemas.microsoft.com/office/powerpoint/2010/main" val="3410086262"/>
+      </p:ext>
+    </p:extLst>
+  </p:cSld>
+  <p:clrMapOvr>
+    <a:masterClrMapping/>
+  </p:clrMapOvr>
+</p:notes>
+</file>
+
+<file path=ppt/notesSlides/notesSlide14.xml><?xml version="1.0" encoding="utf-8"?>
+<p:notes xmlns:a="http://schemas.openxmlformats.org/drawingml/2006/main" xmlns:r="http://schemas.openxmlformats.org/officeDocument/2006/relationships" xmlns:p="http://schemas.openxmlformats.org/presentationml/2006/main">
+  <p:cSld>
+    <p:spTree>
+      <p:nvGrpSpPr>
+        <p:cNvPr id="1" name=""/>
+        <p:cNvGrpSpPr/>
+        <p:nvPr/>
+      </p:nvGrpSpPr>
+      <p:grpSpPr>
+        <a:xfrm>
+          <a:off x="0" y="0"/>
+          <a:ext cx="0" cy="0"/>
+          <a:chOff x="0" y="0"/>
+          <a:chExt cx="0" cy="0"/>
+        </a:xfrm>
+      </p:grpSpPr>
+      <p:sp>
+        <p:nvSpPr>
+          <p:cNvPr id="2" name="Folienbildplatzhalter 1"/>
+          <p:cNvSpPr>
+            <a:spLocks noGrp="1" noRot="1" noChangeAspect="1"/>
+          </p:cNvSpPr>
+          <p:nvPr>
+            <p:ph type="sldImg"/>
+          </p:nvPr>
+        </p:nvSpPr>
+        <p:spPr/>
+      </p:sp>
+      <p:sp>
+        <p:nvSpPr>
+          <p:cNvPr id="3" name="Notizenplatzhalter 2"/>
+          <p:cNvSpPr>
+            <a:spLocks noGrp="1"/>
+          </p:cNvSpPr>
+          <p:nvPr>
+            <p:ph type="body" idx="1"/>
+          </p:nvPr>
+        </p:nvSpPr>
+        <p:spPr/>
+        <p:txBody>
+          <a:bodyPr/>
+          <a:lstStyle/>
+          <a:p>
+            <a:pPr marL="0" marR="0" indent="0" algn="l" defTabSz="914400" rtl="0" eaLnBrk="1" fontAlgn="auto" latinLnBrk="0" hangingPunct="1">
+              <a:lnSpc>
+                <a:spcPct val="100000"/>
+              </a:lnSpc>
+              <a:spcBef>
+                <a:spcPts val="0"/>
+              </a:spcBef>
+              <a:spcAft>
+                <a:spcPts val="0"/>
+              </a:spcAft>
+              <a:buClrTx/>
+              <a:buSzTx/>
+              <a:buFontTx/>
+              <a:buNone/>
+              <a:tabLst/>
+              <a:defRPr/>
+            </a:pPr>
+            <a:r>
+              <a:rPr lang="de-AT" dirty="0" smtClean="0"/>
+              <a:t>KU</a:t>
+            </a:r>
+          </a:p>
+          <a:p>
+            <a:endParaRPr lang="de-AT" dirty="0"/>
+          </a:p>
+        </p:txBody>
+      </p:sp>
+      <p:sp>
+        <p:nvSpPr>
+          <p:cNvPr id="4" name="Foliennummernplatzhalter 3"/>
+          <p:cNvSpPr>
+            <a:spLocks noGrp="1"/>
+          </p:cNvSpPr>
+          <p:nvPr>
+            <p:ph type="sldNum" sz="quarter" idx="10"/>
+          </p:nvPr>
+        </p:nvSpPr>
+        <p:spPr/>
+        <p:txBody>
+          <a:bodyPr/>
+          <a:lstStyle/>
+          <a:p>
+            <a:fld id="{D9823AE5-66C5-4B88-BD88-B0517FC31F87}" type="slidenum">
+              <a:rPr lang="de-AT" smtClean="0"/>
+              <a:t>14</a:t>
+            </a:fld>
+            <a:endParaRPr lang="de-AT"/>
+          </a:p>
+        </p:txBody>
+      </p:sp>
+    </p:spTree>
+    <p:extLst>
+      <p:ext uri="{BB962C8B-B14F-4D97-AF65-F5344CB8AC3E}">
+        <p14:creationId xmlns:p14="http://schemas.microsoft.com/office/powerpoint/2010/main" val="3738996012"/>
       </p:ext>
     </p:extLst>
   </p:cSld>
@@ -606,9 +1121,349 @@
           <a:bodyPr/>
           <a:lstStyle/>
           <a:p>
-            <a:r>
-              <a:rPr lang="de-AT" dirty="0" smtClean="0"/>
-              <a:t>MMU Integration: Alle Pointer der </a:t>
+            <a:pPr marL="0" marR="0" indent="0" algn="l" defTabSz="914400" rtl="0" eaLnBrk="1" fontAlgn="auto" latinLnBrk="0" hangingPunct="1">
+              <a:lnSpc>
+                <a:spcPct val="100000"/>
+              </a:lnSpc>
+              <a:spcBef>
+                <a:spcPts val="0"/>
+              </a:spcBef>
+              <a:spcAft>
+                <a:spcPts val="0"/>
+              </a:spcAft>
+              <a:buClrTx/>
+              <a:buSzTx/>
+              <a:buFontTx/>
+              <a:buNone/>
+              <a:tabLst/>
+              <a:defRPr/>
+            </a:pPr>
+            <a:r>
+              <a:rPr lang="de-AT" dirty="0" err="1" smtClean="0"/>
+              <a:t>Morti</a:t>
+            </a:r>
+            <a:endParaRPr lang="de-AT" dirty="0" smtClean="0"/>
+          </a:p>
+          <a:p>
+            <a:endParaRPr lang="de-AT" dirty="0"/>
+          </a:p>
+        </p:txBody>
+      </p:sp>
+      <p:sp>
+        <p:nvSpPr>
+          <p:cNvPr id="4" name="Foliennummernplatzhalter 3"/>
+          <p:cNvSpPr>
+            <a:spLocks noGrp="1"/>
+          </p:cNvSpPr>
+          <p:nvPr>
+            <p:ph type="sldNum" sz="quarter" idx="10"/>
+          </p:nvPr>
+        </p:nvSpPr>
+        <p:spPr/>
+        <p:txBody>
+          <a:bodyPr/>
+          <a:lstStyle/>
+          <a:p>
+            <a:fld id="{D9823AE5-66C5-4B88-BD88-B0517FC31F87}" type="slidenum">
+              <a:rPr lang="de-AT" smtClean="0"/>
+              <a:t>2</a:t>
+            </a:fld>
+            <a:endParaRPr lang="de-AT"/>
+          </a:p>
+        </p:txBody>
+      </p:sp>
+    </p:spTree>
+    <p:extLst>
+      <p:ext uri="{BB962C8B-B14F-4D97-AF65-F5344CB8AC3E}">
+        <p14:creationId xmlns:p14="http://schemas.microsoft.com/office/powerpoint/2010/main" val="209546563"/>
+      </p:ext>
+    </p:extLst>
+  </p:cSld>
+  <p:clrMapOvr>
+    <a:masterClrMapping/>
+  </p:clrMapOvr>
+</p:notes>
+</file>
+
+<file path=ppt/notesSlides/notesSlide3.xml><?xml version="1.0" encoding="utf-8"?>
+<p:notes xmlns:a="http://schemas.openxmlformats.org/drawingml/2006/main" xmlns:r="http://schemas.openxmlformats.org/officeDocument/2006/relationships" xmlns:p="http://schemas.openxmlformats.org/presentationml/2006/main">
+  <p:cSld>
+    <p:spTree>
+      <p:nvGrpSpPr>
+        <p:cNvPr id="1" name=""/>
+        <p:cNvGrpSpPr/>
+        <p:nvPr/>
+      </p:nvGrpSpPr>
+      <p:grpSpPr>
+        <a:xfrm>
+          <a:off x="0" y="0"/>
+          <a:ext cx="0" cy="0"/>
+          <a:chOff x="0" y="0"/>
+          <a:chExt cx="0" cy="0"/>
+        </a:xfrm>
+      </p:grpSpPr>
+      <p:sp>
+        <p:nvSpPr>
+          <p:cNvPr id="2" name="Folienbildplatzhalter 1"/>
+          <p:cNvSpPr>
+            <a:spLocks noGrp="1" noRot="1" noChangeAspect="1"/>
+          </p:cNvSpPr>
+          <p:nvPr>
+            <p:ph type="sldImg"/>
+          </p:nvPr>
+        </p:nvSpPr>
+        <p:spPr/>
+      </p:sp>
+      <p:sp>
+        <p:nvSpPr>
+          <p:cNvPr id="3" name="Notizenplatzhalter 2"/>
+          <p:cNvSpPr>
+            <a:spLocks noGrp="1"/>
+          </p:cNvSpPr>
+          <p:nvPr>
+            <p:ph type="body" idx="1"/>
+          </p:nvPr>
+        </p:nvSpPr>
+        <p:spPr/>
+        <p:txBody>
+          <a:bodyPr/>
+          <a:lstStyle/>
+          <a:p>
+            <a:pPr marL="0" marR="0" indent="0" algn="l" defTabSz="914400" rtl="0" eaLnBrk="1" fontAlgn="auto" latinLnBrk="0" hangingPunct="1">
+              <a:lnSpc>
+                <a:spcPct val="100000"/>
+              </a:lnSpc>
+              <a:spcBef>
+                <a:spcPts val="0"/>
+              </a:spcBef>
+              <a:spcAft>
+                <a:spcPts val="0"/>
+              </a:spcAft>
+              <a:buClrTx/>
+              <a:buSzTx/>
+              <a:buFontTx/>
+              <a:buNone/>
+              <a:tabLst/>
+              <a:defRPr/>
+            </a:pPr>
+            <a:r>
+              <a:rPr lang="de-AT" dirty="0" err="1" smtClean="0"/>
+              <a:t>Morti</a:t>
+            </a:r>
+            <a:endParaRPr lang="de-AT" dirty="0" smtClean="0"/>
+          </a:p>
+          <a:p>
+            <a:endParaRPr lang="de-AT" dirty="0"/>
+          </a:p>
+        </p:txBody>
+      </p:sp>
+      <p:sp>
+        <p:nvSpPr>
+          <p:cNvPr id="4" name="Foliennummernplatzhalter 3"/>
+          <p:cNvSpPr>
+            <a:spLocks noGrp="1"/>
+          </p:cNvSpPr>
+          <p:nvPr>
+            <p:ph type="sldNum" sz="quarter" idx="10"/>
+          </p:nvPr>
+        </p:nvSpPr>
+        <p:spPr/>
+        <p:txBody>
+          <a:bodyPr/>
+          <a:lstStyle/>
+          <a:p>
+            <a:fld id="{D9823AE5-66C5-4B88-BD88-B0517FC31F87}" type="slidenum">
+              <a:rPr lang="de-AT" smtClean="0"/>
+              <a:t>3</a:t>
+            </a:fld>
+            <a:endParaRPr lang="de-AT"/>
+          </a:p>
+        </p:txBody>
+      </p:sp>
+    </p:spTree>
+    <p:extLst>
+      <p:ext uri="{BB962C8B-B14F-4D97-AF65-F5344CB8AC3E}">
+        <p14:creationId xmlns:p14="http://schemas.microsoft.com/office/powerpoint/2010/main" val="3082780463"/>
+      </p:ext>
+    </p:extLst>
+  </p:cSld>
+  <p:clrMapOvr>
+    <a:masterClrMapping/>
+  </p:clrMapOvr>
+</p:notes>
+</file>
+
+<file path=ppt/notesSlides/notesSlide4.xml><?xml version="1.0" encoding="utf-8"?>
+<p:notes xmlns:a="http://schemas.openxmlformats.org/drawingml/2006/main" xmlns:r="http://schemas.openxmlformats.org/officeDocument/2006/relationships" xmlns:p="http://schemas.openxmlformats.org/presentationml/2006/main">
+  <p:cSld>
+    <p:spTree>
+      <p:nvGrpSpPr>
+        <p:cNvPr id="1" name=""/>
+        <p:cNvGrpSpPr/>
+        <p:nvPr/>
+      </p:nvGrpSpPr>
+      <p:grpSpPr>
+        <a:xfrm>
+          <a:off x="0" y="0"/>
+          <a:ext cx="0" cy="0"/>
+          <a:chOff x="0" y="0"/>
+          <a:chExt cx="0" cy="0"/>
+        </a:xfrm>
+      </p:grpSpPr>
+      <p:sp>
+        <p:nvSpPr>
+          <p:cNvPr id="2" name="Folienbildplatzhalter 1"/>
+          <p:cNvSpPr>
+            <a:spLocks noGrp="1" noRot="1" noChangeAspect="1"/>
+          </p:cNvSpPr>
+          <p:nvPr>
+            <p:ph type="sldImg"/>
+          </p:nvPr>
+        </p:nvSpPr>
+        <p:spPr/>
+      </p:sp>
+      <p:sp>
+        <p:nvSpPr>
+          <p:cNvPr id="3" name="Notizenplatzhalter 2"/>
+          <p:cNvSpPr>
+            <a:spLocks noGrp="1"/>
+          </p:cNvSpPr>
+          <p:nvPr>
+            <p:ph type="body" idx="1"/>
+          </p:nvPr>
+        </p:nvSpPr>
+        <p:spPr/>
+        <p:txBody>
+          <a:bodyPr/>
+          <a:lstStyle/>
+          <a:p>
+            <a:pPr marL="0" marR="0" indent="0" algn="l" defTabSz="914400" rtl="0" eaLnBrk="1" fontAlgn="auto" latinLnBrk="0" hangingPunct="1">
+              <a:lnSpc>
+                <a:spcPct val="100000"/>
+              </a:lnSpc>
+              <a:spcBef>
+                <a:spcPts val="0"/>
+              </a:spcBef>
+              <a:spcAft>
+                <a:spcPts val="0"/>
+              </a:spcAft>
+              <a:buClrTx/>
+              <a:buSzTx/>
+              <a:buFontTx/>
+              <a:buNone/>
+              <a:tabLst/>
+              <a:defRPr/>
+            </a:pPr>
+            <a:r>
+              <a:rPr lang="de-AT" dirty="0" err="1" smtClean="0"/>
+              <a:t>Morti</a:t>
+            </a:r>
+            <a:endParaRPr lang="de-AT" dirty="0" smtClean="0"/>
+          </a:p>
+          <a:p>
+            <a:r>
+              <a:rPr lang="de-AT" dirty="0" smtClean="0"/>
+              <a:t>MMU </a:t>
+            </a:r>
+            <a:r>
+              <a:rPr lang="de-AT" dirty="0" smtClean="0"/>
+              <a:t>ist zwar implementiert, der Sprung zum Prozess</a:t>
+            </a:r>
+            <a:r>
+              <a:rPr lang="de-AT" baseline="0" dirty="0" smtClean="0"/>
+              <a:t> klappt jedoch nicht. </a:t>
+            </a:r>
+            <a:endParaRPr lang="de-AT" dirty="0"/>
+          </a:p>
+        </p:txBody>
+      </p:sp>
+      <p:sp>
+        <p:nvSpPr>
+          <p:cNvPr id="4" name="Foliennummernplatzhalter 3"/>
+          <p:cNvSpPr>
+            <a:spLocks noGrp="1"/>
+          </p:cNvSpPr>
+          <p:nvPr>
+            <p:ph type="sldNum" sz="quarter" idx="10"/>
+          </p:nvPr>
+        </p:nvSpPr>
+        <p:spPr/>
+        <p:txBody>
+          <a:bodyPr/>
+          <a:lstStyle/>
+          <a:p>
+            <a:fld id="{D9823AE5-66C5-4B88-BD88-B0517FC31F87}" type="slidenum">
+              <a:rPr lang="de-AT" smtClean="0"/>
+              <a:t>4</a:t>
+            </a:fld>
+            <a:endParaRPr lang="de-AT"/>
+          </a:p>
+        </p:txBody>
+      </p:sp>
+    </p:spTree>
+    <p:extLst>
+      <p:ext uri="{BB962C8B-B14F-4D97-AF65-F5344CB8AC3E}">
+        <p14:creationId xmlns:p14="http://schemas.microsoft.com/office/powerpoint/2010/main" val="2224154810"/>
+      </p:ext>
+    </p:extLst>
+  </p:cSld>
+  <p:clrMapOvr>
+    <a:masterClrMapping/>
+  </p:clrMapOvr>
+</p:notes>
+</file>
+
+<file path=ppt/notesSlides/notesSlide5.xml><?xml version="1.0" encoding="utf-8"?>
+<p:notes xmlns:a="http://schemas.openxmlformats.org/drawingml/2006/main" xmlns:r="http://schemas.openxmlformats.org/officeDocument/2006/relationships" xmlns:p="http://schemas.openxmlformats.org/presentationml/2006/main">
+  <p:cSld>
+    <p:spTree>
+      <p:nvGrpSpPr>
+        <p:cNvPr id="1" name=""/>
+        <p:cNvGrpSpPr/>
+        <p:nvPr/>
+      </p:nvGrpSpPr>
+      <p:grpSpPr>
+        <a:xfrm>
+          <a:off x="0" y="0"/>
+          <a:ext cx="0" cy="0"/>
+          <a:chOff x="0" y="0"/>
+          <a:chExt cx="0" cy="0"/>
+        </a:xfrm>
+      </p:grpSpPr>
+      <p:sp>
+        <p:nvSpPr>
+          <p:cNvPr id="2" name="Folienbildplatzhalter 1"/>
+          <p:cNvSpPr>
+            <a:spLocks noGrp="1" noRot="1" noChangeAspect="1"/>
+          </p:cNvSpPr>
+          <p:nvPr>
+            <p:ph type="sldImg"/>
+          </p:nvPr>
+        </p:nvSpPr>
+        <p:spPr/>
+      </p:sp>
+      <p:sp>
+        <p:nvSpPr>
+          <p:cNvPr id="3" name="Notizenplatzhalter 2"/>
+          <p:cNvSpPr>
+            <a:spLocks noGrp="1"/>
+          </p:cNvSpPr>
+          <p:nvPr>
+            <p:ph type="body" idx="1"/>
+          </p:nvPr>
+        </p:nvSpPr>
+        <p:spPr/>
+        <p:txBody>
+          <a:bodyPr/>
+          <a:lstStyle/>
+          <a:p>
+            <a:r>
+              <a:rPr lang="de-AT" dirty="0" smtClean="0"/>
+              <a:t>MMU </a:t>
+            </a:r>
+            <a:r>
+              <a:rPr lang="de-AT" dirty="0" smtClean="0"/>
+              <a:t>Integration: Alle Pointer der </a:t>
             </a:r>
             <a:r>
               <a:rPr lang="de-AT" dirty="0" err="1" smtClean="0"/>
@@ -616,7 +1471,11 @@
             </a:r>
             <a:r>
               <a:rPr lang="de-AT" baseline="0" dirty="0" smtClean="0"/>
-              <a:t> müssen entsprechend </a:t>
+              <a:t> müssen </a:t>
+            </a:r>
+            <a:r>
+              <a:rPr lang="de-AT" baseline="0" dirty="0" smtClean="0"/>
+              <a:t>entsprechend </a:t>
             </a:r>
             <a:r>
               <a:rPr lang="de-AT" baseline="0" dirty="0" err="1" smtClean="0"/>
@@ -624,7 +1483,17 @@
             </a:r>
             <a:r>
               <a:rPr lang="de-AT" baseline="0" dirty="0" smtClean="0"/>
-              <a:t> werden. IPC muss an den Speicherbereich angepasst werden.</a:t>
+              <a:t> werden. IPC muss an den Speicherbereich angepasst werden</a:t>
+            </a:r>
+            <a:r>
+              <a:rPr lang="de-AT" baseline="0" dirty="0" smtClean="0"/>
+              <a:t>.</a:t>
+            </a:r>
+          </a:p>
+          <a:p>
+            <a:r>
+              <a:rPr lang="de-AT" baseline="0" dirty="0" smtClean="0"/>
+              <a:t>Matthias</a:t>
             </a:r>
             <a:endParaRPr lang="de-AT" dirty="0"/>
           </a:p>
@@ -657,6 +1526,377 @@
     <p:extLst>
       <p:ext uri="{BB962C8B-B14F-4D97-AF65-F5344CB8AC3E}">
         <p14:creationId xmlns:p14="http://schemas.microsoft.com/office/powerpoint/2010/main" val="1497895094"/>
+      </p:ext>
+    </p:extLst>
+  </p:cSld>
+  <p:clrMapOvr>
+    <a:masterClrMapping/>
+  </p:clrMapOvr>
+</p:notes>
+</file>
+
+<file path=ppt/notesSlides/notesSlide6.xml><?xml version="1.0" encoding="utf-8"?>
+<p:notes xmlns:a="http://schemas.openxmlformats.org/drawingml/2006/main" xmlns:r="http://schemas.openxmlformats.org/officeDocument/2006/relationships" xmlns:p="http://schemas.openxmlformats.org/presentationml/2006/main">
+  <p:cSld>
+    <p:spTree>
+      <p:nvGrpSpPr>
+        <p:cNvPr id="1" name=""/>
+        <p:cNvGrpSpPr/>
+        <p:nvPr/>
+      </p:nvGrpSpPr>
+      <p:grpSpPr>
+        <a:xfrm>
+          <a:off x="0" y="0"/>
+          <a:ext cx="0" cy="0"/>
+          <a:chOff x="0" y="0"/>
+          <a:chExt cx="0" cy="0"/>
+        </a:xfrm>
+      </p:grpSpPr>
+      <p:sp>
+        <p:nvSpPr>
+          <p:cNvPr id="2" name="Folienbildplatzhalter 1"/>
+          <p:cNvSpPr>
+            <a:spLocks noGrp="1" noRot="1" noChangeAspect="1"/>
+          </p:cNvSpPr>
+          <p:nvPr>
+            <p:ph type="sldImg"/>
+          </p:nvPr>
+        </p:nvSpPr>
+        <p:spPr/>
+      </p:sp>
+      <p:sp>
+        <p:nvSpPr>
+          <p:cNvPr id="3" name="Notizenplatzhalter 2"/>
+          <p:cNvSpPr>
+            <a:spLocks noGrp="1"/>
+          </p:cNvSpPr>
+          <p:nvPr>
+            <p:ph type="body" idx="1"/>
+          </p:nvPr>
+        </p:nvSpPr>
+        <p:spPr/>
+        <p:txBody>
+          <a:bodyPr/>
+          <a:lstStyle/>
+          <a:p>
+            <a:r>
+              <a:rPr lang="de-AT" dirty="0" smtClean="0"/>
+              <a:t>Matthias</a:t>
+            </a:r>
+            <a:endParaRPr lang="de-AT" dirty="0"/>
+          </a:p>
+        </p:txBody>
+      </p:sp>
+      <p:sp>
+        <p:nvSpPr>
+          <p:cNvPr id="4" name="Foliennummernplatzhalter 3"/>
+          <p:cNvSpPr>
+            <a:spLocks noGrp="1"/>
+          </p:cNvSpPr>
+          <p:nvPr>
+            <p:ph type="sldNum" sz="quarter" idx="10"/>
+          </p:nvPr>
+        </p:nvSpPr>
+        <p:spPr/>
+        <p:txBody>
+          <a:bodyPr/>
+          <a:lstStyle/>
+          <a:p>
+            <a:fld id="{D9823AE5-66C5-4B88-BD88-B0517FC31F87}" type="slidenum">
+              <a:rPr lang="de-AT" smtClean="0"/>
+              <a:t>6</a:t>
+            </a:fld>
+            <a:endParaRPr lang="de-AT"/>
+          </a:p>
+        </p:txBody>
+      </p:sp>
+    </p:spTree>
+    <p:extLst>
+      <p:ext uri="{BB962C8B-B14F-4D97-AF65-F5344CB8AC3E}">
+        <p14:creationId xmlns:p14="http://schemas.microsoft.com/office/powerpoint/2010/main" val="3071036266"/>
+      </p:ext>
+    </p:extLst>
+  </p:cSld>
+  <p:clrMapOvr>
+    <a:masterClrMapping/>
+  </p:clrMapOvr>
+</p:notes>
+</file>
+
+<file path=ppt/notesSlides/notesSlide7.xml><?xml version="1.0" encoding="utf-8"?>
+<p:notes xmlns:a="http://schemas.openxmlformats.org/drawingml/2006/main" xmlns:r="http://schemas.openxmlformats.org/officeDocument/2006/relationships" xmlns:p="http://schemas.openxmlformats.org/presentationml/2006/main">
+  <p:cSld>
+    <p:spTree>
+      <p:nvGrpSpPr>
+        <p:cNvPr id="1" name=""/>
+        <p:cNvGrpSpPr/>
+        <p:nvPr/>
+      </p:nvGrpSpPr>
+      <p:grpSpPr>
+        <a:xfrm>
+          <a:off x="0" y="0"/>
+          <a:ext cx="0" cy="0"/>
+          <a:chOff x="0" y="0"/>
+          <a:chExt cx="0" cy="0"/>
+        </a:xfrm>
+      </p:grpSpPr>
+      <p:sp>
+        <p:nvSpPr>
+          <p:cNvPr id="2" name="Folienbildplatzhalter 1"/>
+          <p:cNvSpPr>
+            <a:spLocks noGrp="1" noRot="1" noChangeAspect="1"/>
+          </p:cNvSpPr>
+          <p:nvPr>
+            <p:ph type="sldImg"/>
+          </p:nvPr>
+        </p:nvSpPr>
+        <p:spPr/>
+      </p:sp>
+      <p:sp>
+        <p:nvSpPr>
+          <p:cNvPr id="3" name="Notizenplatzhalter 2"/>
+          <p:cNvSpPr>
+            <a:spLocks noGrp="1"/>
+          </p:cNvSpPr>
+          <p:nvPr>
+            <p:ph type="body" idx="1"/>
+          </p:nvPr>
+        </p:nvSpPr>
+        <p:spPr/>
+        <p:txBody>
+          <a:bodyPr/>
+          <a:lstStyle/>
+          <a:p>
+            <a:r>
+              <a:rPr lang="de-AT" dirty="0" smtClean="0"/>
+              <a:t>Matthias</a:t>
+            </a:r>
+            <a:endParaRPr lang="de-AT" dirty="0"/>
+          </a:p>
+        </p:txBody>
+      </p:sp>
+      <p:sp>
+        <p:nvSpPr>
+          <p:cNvPr id="4" name="Foliennummernplatzhalter 3"/>
+          <p:cNvSpPr>
+            <a:spLocks noGrp="1"/>
+          </p:cNvSpPr>
+          <p:nvPr>
+            <p:ph type="sldNum" sz="quarter" idx="10"/>
+          </p:nvPr>
+        </p:nvSpPr>
+        <p:spPr/>
+        <p:txBody>
+          <a:bodyPr/>
+          <a:lstStyle/>
+          <a:p>
+            <a:fld id="{D9823AE5-66C5-4B88-BD88-B0517FC31F87}" type="slidenum">
+              <a:rPr lang="de-AT" smtClean="0"/>
+              <a:t>7</a:t>
+            </a:fld>
+            <a:endParaRPr lang="de-AT"/>
+          </a:p>
+        </p:txBody>
+      </p:sp>
+    </p:spTree>
+    <p:extLst>
+      <p:ext uri="{BB962C8B-B14F-4D97-AF65-F5344CB8AC3E}">
+        <p14:creationId xmlns:p14="http://schemas.microsoft.com/office/powerpoint/2010/main" val="335671992"/>
+      </p:ext>
+    </p:extLst>
+  </p:cSld>
+  <p:clrMapOvr>
+    <a:masterClrMapping/>
+  </p:clrMapOvr>
+</p:notes>
+</file>
+
+<file path=ppt/notesSlides/notesSlide8.xml><?xml version="1.0" encoding="utf-8"?>
+<p:notes xmlns:a="http://schemas.openxmlformats.org/drawingml/2006/main" xmlns:r="http://schemas.openxmlformats.org/officeDocument/2006/relationships" xmlns:p="http://schemas.openxmlformats.org/presentationml/2006/main">
+  <p:cSld>
+    <p:spTree>
+      <p:nvGrpSpPr>
+        <p:cNvPr id="1" name=""/>
+        <p:cNvGrpSpPr/>
+        <p:nvPr/>
+      </p:nvGrpSpPr>
+      <p:grpSpPr>
+        <a:xfrm>
+          <a:off x="0" y="0"/>
+          <a:ext cx="0" cy="0"/>
+          <a:chOff x="0" y="0"/>
+          <a:chExt cx="0" cy="0"/>
+        </a:xfrm>
+      </p:grpSpPr>
+      <p:sp>
+        <p:nvSpPr>
+          <p:cNvPr id="2" name="Folienbildplatzhalter 1"/>
+          <p:cNvSpPr>
+            <a:spLocks noGrp="1" noRot="1" noChangeAspect="1"/>
+          </p:cNvSpPr>
+          <p:nvPr>
+            <p:ph type="sldImg"/>
+          </p:nvPr>
+        </p:nvSpPr>
+        <p:spPr/>
+      </p:sp>
+      <p:sp>
+        <p:nvSpPr>
+          <p:cNvPr id="3" name="Notizenplatzhalter 2"/>
+          <p:cNvSpPr>
+            <a:spLocks noGrp="1"/>
+          </p:cNvSpPr>
+          <p:nvPr>
+            <p:ph type="body" idx="1"/>
+          </p:nvPr>
+        </p:nvSpPr>
+        <p:spPr/>
+        <p:txBody>
+          <a:bodyPr/>
+          <a:lstStyle/>
+          <a:p>
+            <a:r>
+              <a:rPr lang="de-AT" dirty="0" smtClean="0"/>
+              <a:t>Manuel</a:t>
+            </a:r>
+            <a:endParaRPr lang="de-AT" dirty="0"/>
+          </a:p>
+        </p:txBody>
+      </p:sp>
+      <p:sp>
+        <p:nvSpPr>
+          <p:cNvPr id="4" name="Foliennummernplatzhalter 3"/>
+          <p:cNvSpPr>
+            <a:spLocks noGrp="1"/>
+          </p:cNvSpPr>
+          <p:nvPr>
+            <p:ph type="sldNum" sz="quarter" idx="10"/>
+          </p:nvPr>
+        </p:nvSpPr>
+        <p:spPr/>
+        <p:txBody>
+          <a:bodyPr/>
+          <a:lstStyle/>
+          <a:p>
+            <a:fld id="{D9823AE5-66C5-4B88-BD88-B0517FC31F87}" type="slidenum">
+              <a:rPr lang="de-AT" smtClean="0"/>
+              <a:t>8</a:t>
+            </a:fld>
+            <a:endParaRPr lang="de-AT"/>
+          </a:p>
+        </p:txBody>
+      </p:sp>
+    </p:spTree>
+    <p:extLst>
+      <p:ext uri="{BB962C8B-B14F-4D97-AF65-F5344CB8AC3E}">
+        <p14:creationId xmlns:p14="http://schemas.microsoft.com/office/powerpoint/2010/main" val="468832196"/>
+      </p:ext>
+    </p:extLst>
+  </p:cSld>
+  <p:clrMapOvr>
+    <a:masterClrMapping/>
+  </p:clrMapOvr>
+</p:notes>
+</file>
+
+<file path=ppt/notesSlides/notesSlide9.xml><?xml version="1.0" encoding="utf-8"?>
+<p:notes xmlns:a="http://schemas.openxmlformats.org/drawingml/2006/main" xmlns:r="http://schemas.openxmlformats.org/officeDocument/2006/relationships" xmlns:p="http://schemas.openxmlformats.org/presentationml/2006/main">
+  <p:cSld>
+    <p:spTree>
+      <p:nvGrpSpPr>
+        <p:cNvPr id="1" name=""/>
+        <p:cNvGrpSpPr/>
+        <p:nvPr/>
+      </p:nvGrpSpPr>
+      <p:grpSpPr>
+        <a:xfrm>
+          <a:off x="0" y="0"/>
+          <a:ext cx="0" cy="0"/>
+          <a:chOff x="0" y="0"/>
+          <a:chExt cx="0" cy="0"/>
+        </a:xfrm>
+      </p:grpSpPr>
+      <p:sp>
+        <p:nvSpPr>
+          <p:cNvPr id="2" name="Folienbildplatzhalter 1"/>
+          <p:cNvSpPr>
+            <a:spLocks noGrp="1" noRot="1" noChangeAspect="1"/>
+          </p:cNvSpPr>
+          <p:nvPr>
+            <p:ph type="sldImg"/>
+          </p:nvPr>
+        </p:nvSpPr>
+        <p:spPr/>
+      </p:sp>
+      <p:sp>
+        <p:nvSpPr>
+          <p:cNvPr id="3" name="Notizenplatzhalter 2"/>
+          <p:cNvSpPr>
+            <a:spLocks noGrp="1"/>
+          </p:cNvSpPr>
+          <p:nvPr>
+            <p:ph type="body" idx="1"/>
+          </p:nvPr>
+        </p:nvSpPr>
+        <p:spPr/>
+        <p:txBody>
+          <a:bodyPr/>
+          <a:lstStyle/>
+          <a:p>
+            <a:pPr marL="0" marR="0" indent="0" algn="l" defTabSz="914400" rtl="0" eaLnBrk="1" fontAlgn="auto" latinLnBrk="0" hangingPunct="1">
+              <a:lnSpc>
+                <a:spcPct val="100000"/>
+              </a:lnSpc>
+              <a:spcBef>
+                <a:spcPts val="0"/>
+              </a:spcBef>
+              <a:spcAft>
+                <a:spcPts val="0"/>
+              </a:spcAft>
+              <a:buClrTx/>
+              <a:buSzTx/>
+              <a:buFontTx/>
+              <a:buNone/>
+              <a:tabLst/>
+              <a:defRPr/>
+            </a:pPr>
+            <a:r>
+              <a:rPr lang="de-AT" dirty="0" smtClean="0"/>
+              <a:t>Manuel</a:t>
+            </a:r>
+          </a:p>
+          <a:p>
+            <a:endParaRPr lang="de-AT" dirty="0"/>
+          </a:p>
+        </p:txBody>
+      </p:sp>
+      <p:sp>
+        <p:nvSpPr>
+          <p:cNvPr id="4" name="Foliennummernplatzhalter 3"/>
+          <p:cNvSpPr>
+            <a:spLocks noGrp="1"/>
+          </p:cNvSpPr>
+          <p:nvPr>
+            <p:ph type="sldNum" sz="quarter" idx="10"/>
+          </p:nvPr>
+        </p:nvSpPr>
+        <p:spPr/>
+        <p:txBody>
+          <a:bodyPr/>
+          <a:lstStyle/>
+          <a:p>
+            <a:fld id="{D9823AE5-66C5-4B88-BD88-B0517FC31F87}" type="slidenum">
+              <a:rPr lang="de-AT" smtClean="0"/>
+              <a:t>9</a:t>
+            </a:fld>
+            <a:endParaRPr lang="de-AT"/>
+          </a:p>
+        </p:txBody>
+      </p:sp>
+    </p:spTree>
+    <p:extLst>
+      <p:ext uri="{BB962C8B-B14F-4D97-AF65-F5344CB8AC3E}">
+        <p14:creationId xmlns:p14="http://schemas.microsoft.com/office/powerpoint/2010/main" val="4198941343"/>
       </p:ext>
     </p:extLst>
   </p:cSld>
@@ -730,7 +1970,7 @@
           <a:p>
             <a:fld id="{7A87F95C-ABE2-411C-B435-A0C7FB9D6E09}" type="datetimeFigureOut">
               <a:rPr lang="de-AT" smtClean="0"/>
-              <a:t>18.06.2013</a:t>
+              <a:t>20.06.2013</a:t>
             </a:fld>
             <a:endParaRPr lang="de-AT"/>
           </a:p>
@@ -1075,7 +2315,7 @@
           <a:p>
             <a:fld id="{7A87F95C-ABE2-411C-B435-A0C7FB9D6E09}" type="datetimeFigureOut">
               <a:rPr lang="de-AT" smtClean="0"/>
-              <a:t>18.06.2013</a:t>
+              <a:t>20.06.2013</a:t>
             </a:fld>
             <a:endParaRPr lang="de-AT"/>
           </a:p>
@@ -1262,7 +2502,7 @@
           <a:p>
             <a:fld id="{7A87F95C-ABE2-411C-B435-A0C7FB9D6E09}" type="datetimeFigureOut">
               <a:rPr lang="de-AT" smtClean="0"/>
-              <a:t>18.06.2013</a:t>
+              <a:t>20.06.2013</a:t>
             </a:fld>
             <a:endParaRPr lang="de-AT"/>
           </a:p>
@@ -1397,7 +2637,7 @@
           <a:p>
             <a:fld id="{7A87F95C-ABE2-411C-B435-A0C7FB9D6E09}" type="datetimeFigureOut">
               <a:rPr lang="de-AT" smtClean="0"/>
-              <a:t>18.06.2013</a:t>
+              <a:t>20.06.2013</a:t>
             </a:fld>
             <a:endParaRPr lang="de-AT"/>
           </a:p>
@@ -1724,7 +2964,7 @@
           <a:p>
             <a:fld id="{7A87F95C-ABE2-411C-B435-A0C7FB9D6E09}" type="datetimeFigureOut">
               <a:rPr lang="de-AT" smtClean="0"/>
-              <a:t>18.06.2013</a:t>
+              <a:t>20.06.2013</a:t>
             </a:fld>
             <a:endParaRPr lang="de-AT"/>
           </a:p>
@@ -2029,7 +3269,7 @@
           <a:p>
             <a:fld id="{7A87F95C-ABE2-411C-B435-A0C7FB9D6E09}" type="datetimeFigureOut">
               <a:rPr lang="de-AT" smtClean="0"/>
-              <a:t>18.06.2013</a:t>
+              <a:t>20.06.2013</a:t>
             </a:fld>
             <a:endParaRPr lang="de-AT"/>
           </a:p>
@@ -2476,7 +3716,7 @@
           <a:p>
             <a:fld id="{7A87F95C-ABE2-411C-B435-A0C7FB9D6E09}" type="datetimeFigureOut">
               <a:rPr lang="de-AT" smtClean="0"/>
-              <a:t>18.06.2013</a:t>
+              <a:t>20.06.2013</a:t>
             </a:fld>
             <a:endParaRPr lang="de-AT"/>
           </a:p>
@@ -2606,7 +3846,7 @@
           <a:p>
             <a:fld id="{7A87F95C-ABE2-411C-B435-A0C7FB9D6E09}" type="datetimeFigureOut">
               <a:rPr lang="de-AT" smtClean="0"/>
-              <a:t>18.06.2013</a:t>
+              <a:t>20.06.2013</a:t>
             </a:fld>
             <a:endParaRPr lang="de-AT"/>
           </a:p>
@@ -2708,7 +3948,7 @@
           <a:p>
             <a:fld id="{7A87F95C-ABE2-411C-B435-A0C7FB9D6E09}" type="datetimeFigureOut">
               <a:rPr lang="de-AT" smtClean="0"/>
-              <a:t>18.06.2013</a:t>
+              <a:t>20.06.2013</a:t>
             </a:fld>
             <a:endParaRPr lang="de-AT"/>
           </a:p>
@@ -2970,7 +4210,7 @@
           <a:p>
             <a:fld id="{7A87F95C-ABE2-411C-B435-A0C7FB9D6E09}" type="datetimeFigureOut">
               <a:rPr lang="de-AT" smtClean="0"/>
-              <a:t>18.06.2013</a:t>
+              <a:t>20.06.2013</a:t>
             </a:fld>
             <a:endParaRPr lang="de-AT"/>
           </a:p>
@@ -3498,7 +4738,7 @@
           <a:p>
             <a:fld id="{7A87F95C-ABE2-411C-B435-A0C7FB9D6E09}" type="datetimeFigureOut">
               <a:rPr lang="de-AT" smtClean="0"/>
-              <a:t>18.06.2013</a:t>
+              <a:t>20.06.2013</a:t>
             </a:fld>
             <a:endParaRPr lang="de-AT"/>
           </a:p>
@@ -3725,7 +4965,7 @@
           <a:p>
             <a:fld id="{7A87F95C-ABE2-411C-B435-A0C7FB9D6E09}" type="datetimeFigureOut">
               <a:rPr lang="de-AT" smtClean="0"/>
-              <a:t>18.06.2013</a:t>
+              <a:t>20.06.2013</a:t>
             </a:fld>
             <a:endParaRPr lang="de-AT"/>
           </a:p>
@@ -4256,7 +5496,7 @@
           <p:nvPr/>
         </p:nvPicPr>
         <p:blipFill>
-          <a:blip r:embed="rId2">
+          <a:blip r:embed="rId3">
             <a:extLst>
               <a:ext uri="{28A0092B-C50C-407E-A947-70E740481C1C}">
                 <a14:useLocalDpi xmlns:a14="http://schemas.microsoft.com/office/drawing/2010/main" val="0"/>
@@ -4343,6 +5583,296 @@
           <a:p>
             <a:r>
               <a:rPr lang="de-AT" dirty="0" smtClean="0"/>
+              <a:t>DMX</a:t>
+            </a:r>
+            <a:endParaRPr lang="de-AT" dirty="0"/>
+          </a:p>
+        </p:txBody>
+      </p:sp>
+      <p:sp>
+        <p:nvSpPr>
+          <p:cNvPr id="3" name="Inhaltsplatzhalter 2"/>
+          <p:cNvSpPr>
+            <a:spLocks noGrp="1"/>
+          </p:cNvSpPr>
+          <p:nvPr>
+            <p:ph sz="quarter" idx="13"/>
+          </p:nvPr>
+        </p:nvSpPr>
+        <p:spPr/>
+        <p:txBody>
+          <a:bodyPr/>
+          <a:lstStyle/>
+          <a:p>
+            <a:r>
+              <a:rPr lang="de-AT" dirty="0" smtClean="0"/>
+              <a:t>Ansteuerung mehrerer Scheinwerfer</a:t>
+            </a:r>
+          </a:p>
+          <a:p>
+            <a:pPr lvl="1"/>
+            <a:r>
+              <a:rPr lang="de-AT" dirty="0" smtClean="0"/>
+              <a:t>Über ein gemeinsames </a:t>
+            </a:r>
+            <a:r>
+              <a:rPr lang="de-AT" dirty="0" err="1" smtClean="0"/>
+              <a:t>Struct</a:t>
+            </a:r>
+            <a:endParaRPr lang="de-AT" dirty="0" smtClean="0"/>
+          </a:p>
+          <a:p>
+            <a:endParaRPr lang="de-AT" dirty="0" smtClean="0"/>
+          </a:p>
+          <a:p>
+            <a:r>
+              <a:rPr lang="de-AT" dirty="0" smtClean="0"/>
+              <a:t>Abstraktion als Treiber</a:t>
+            </a:r>
+          </a:p>
+          <a:p>
+            <a:pPr lvl="1"/>
+            <a:r>
+              <a:rPr lang="de-AT" dirty="0" smtClean="0"/>
+              <a:t>Nur noch die Daten </a:t>
+            </a:r>
+            <a:r>
+              <a:rPr lang="de-AT" dirty="0" err="1" smtClean="0"/>
+              <a:t>bytes</a:t>
+            </a:r>
+            <a:r>
+              <a:rPr lang="de-AT" dirty="0" smtClean="0"/>
+              <a:t> werden benötigt</a:t>
+            </a:r>
+          </a:p>
+          <a:p>
+            <a:endParaRPr lang="de-AT" dirty="0"/>
+          </a:p>
+          <a:p>
+            <a:r>
+              <a:rPr lang="de-AT" dirty="0" smtClean="0"/>
+              <a:t>Verwendet</a:t>
+            </a:r>
+          </a:p>
+          <a:p>
+            <a:pPr lvl="1"/>
+            <a:r>
+              <a:rPr lang="de-AT" dirty="0" smtClean="0"/>
+              <a:t>GPIO Treiber</a:t>
+            </a:r>
+          </a:p>
+          <a:p>
+            <a:pPr lvl="1"/>
+            <a:r>
+              <a:rPr lang="de-AT" dirty="0" smtClean="0"/>
+              <a:t>UART Treiber</a:t>
+            </a:r>
+          </a:p>
+          <a:p>
+            <a:pPr lvl="1"/>
+            <a:endParaRPr lang="de-AT" dirty="0" smtClean="0"/>
+          </a:p>
+          <a:p>
+            <a:pPr lvl="1"/>
+            <a:endParaRPr lang="de-AT" dirty="0"/>
+          </a:p>
+        </p:txBody>
+      </p:sp>
+    </p:spTree>
+    <p:extLst>
+      <p:ext uri="{BB962C8B-B14F-4D97-AF65-F5344CB8AC3E}">
+        <p14:creationId xmlns:p14="http://schemas.microsoft.com/office/powerpoint/2010/main" val="645321659"/>
+      </p:ext>
+    </p:extLst>
+  </p:cSld>
+  <p:clrMapOvr>
+    <a:masterClrMapping/>
+  </p:clrMapOvr>
+  <mc:AlternateContent xmlns:mc="http://schemas.openxmlformats.org/markup-compatibility/2006" xmlns:p14="http://schemas.microsoft.com/office/powerpoint/2010/main">
+    <mc:Choice Requires="p14">
+      <p:transition spd="med" p14:dur="700">
+        <p:fade/>
+      </p:transition>
+    </mc:Choice>
+    <mc:Fallback xmlns="">
+      <p:transition spd="med">
+        <p:fade/>
+      </p:transition>
+    </mc:Fallback>
+  </mc:AlternateContent>
+</p:sld>
+</file>
+
+<file path=ppt/slides/slide11.xml><?xml version="1.0" encoding="utf-8"?>
+<p:sld xmlns:a="http://schemas.openxmlformats.org/drawingml/2006/main" xmlns:r="http://schemas.openxmlformats.org/officeDocument/2006/relationships" xmlns:p="http://schemas.openxmlformats.org/presentationml/2006/main">
+  <p:cSld>
+    <p:spTree>
+      <p:nvGrpSpPr>
+        <p:cNvPr id="1" name=""/>
+        <p:cNvGrpSpPr/>
+        <p:nvPr/>
+      </p:nvGrpSpPr>
+      <p:grpSpPr>
+        <a:xfrm>
+          <a:off x="0" y="0"/>
+          <a:ext cx="0" cy="0"/>
+          <a:chOff x="0" y="0"/>
+          <a:chExt cx="0" cy="0"/>
+        </a:xfrm>
+      </p:grpSpPr>
+      <p:sp>
+        <p:nvSpPr>
+          <p:cNvPr id="2" name="Titel 1"/>
+          <p:cNvSpPr>
+            <a:spLocks noGrp="1"/>
+          </p:cNvSpPr>
+          <p:nvPr>
+            <p:ph type="title"/>
+          </p:nvPr>
+        </p:nvSpPr>
+        <p:spPr/>
+        <p:txBody>
+          <a:bodyPr/>
+          <a:lstStyle/>
+          <a:p>
+            <a:r>
+              <a:rPr lang="de-AT" dirty="0" smtClean="0"/>
+              <a:t>IO System</a:t>
+            </a:r>
+            <a:endParaRPr lang="de-AT" dirty="0"/>
+          </a:p>
+        </p:txBody>
+      </p:sp>
+      <p:pic>
+        <p:nvPicPr>
+          <p:cNvPr id="3076" name="Picture 4"/>
+          <p:cNvPicPr>
+            <a:picLocks noChangeAspect="1" noChangeArrowheads="1"/>
+          </p:cNvPicPr>
+          <p:nvPr/>
+        </p:nvPicPr>
+        <p:blipFill>
+          <a:blip r:embed="rId3">
+            <a:extLst>
+              <a:ext uri="{28A0092B-C50C-407E-A947-70E740481C1C}">
+                <a14:useLocalDpi xmlns:a14="http://schemas.microsoft.com/office/drawing/2010/main" val="0"/>
+              </a:ext>
+            </a:extLst>
+          </a:blip>
+          <a:srcRect/>
+          <a:stretch>
+            <a:fillRect/>
+          </a:stretch>
+        </p:blipFill>
+        <p:spPr bwMode="auto">
+          <a:xfrm>
+            <a:off x="744116" y="1052736"/>
+            <a:ext cx="7594736" cy="5042694"/>
+          </a:xfrm>
+          <a:prstGeom prst="rect">
+            <a:avLst/>
+          </a:prstGeom>
+          <a:noFill/>
+          <a:ln>
+            <a:noFill/>
+          </a:ln>
+          <a:effectLst/>
+          <a:extLst>
+            <a:ext uri="{909E8E84-426E-40DD-AFC4-6F175D3DCCD1}">
+              <a14:hiddenFill xmlns:a14="http://schemas.microsoft.com/office/drawing/2010/main">
+                <a:solidFill>
+                  <a:schemeClr val="accent1"/>
+                </a:solidFill>
+              </a14:hiddenFill>
+            </a:ext>
+            <a:ext uri="{91240B29-F687-4F45-9708-019B960494DF}">
+              <a14:hiddenLine xmlns:a14="http://schemas.microsoft.com/office/drawing/2010/main" w="9525">
+                <a:solidFill>
+                  <a:schemeClr val="tx1"/>
+                </a:solidFill>
+                <a:miter lim="800000"/>
+                <a:headEnd/>
+                <a:tailEnd/>
+              </a14:hiddenLine>
+            </a:ext>
+            <a:ext uri="{AF507438-7753-43E0-B8FC-AC1667EBCBE1}">
+              <a14:hiddenEffects xmlns:a14="http://schemas.microsoft.com/office/drawing/2010/main">
+                <a:effectLst>
+                  <a:outerShdw dist="35921" dir="2700000" algn="ctr" rotWithShape="0">
+                    <a:schemeClr val="bg2"/>
+                  </a:outerShdw>
+                </a:effectLst>
+              </a14:hiddenEffects>
+            </a:ext>
+          </a:extLst>
+        </p:spPr>
+      </p:pic>
+    </p:spTree>
+    <p:extLst>
+      <p:ext uri="{BB962C8B-B14F-4D97-AF65-F5344CB8AC3E}">
+        <p14:creationId xmlns:p14="http://schemas.microsoft.com/office/powerpoint/2010/main" val="269939697"/>
+      </p:ext>
+    </p:extLst>
+  </p:cSld>
+  <p:clrMapOvr>
+    <a:masterClrMapping/>
+  </p:clrMapOvr>
+  <mc:AlternateContent xmlns:mc="http://schemas.openxmlformats.org/markup-compatibility/2006" xmlns:p14="http://schemas.microsoft.com/office/powerpoint/2010/main">
+    <mc:Choice Requires="p14">
+      <p:transition spd="med" p14:dur="700">
+        <p:fade/>
+      </p:transition>
+    </mc:Choice>
+    <mc:Fallback xmlns="">
+      <p:transition spd="med">
+        <p:fade/>
+      </p:transition>
+    </mc:Fallback>
+  </mc:AlternateContent>
+  <p:timing>
+    <p:tnLst>
+      <p:par>
+        <p:cTn id="1" dur="indefinite" restart="never" nodeType="tmRoot"/>
+      </p:par>
+    </p:tnLst>
+  </p:timing>
+</p:sld>
+</file>
+
+<file path=ppt/slides/slide12.xml><?xml version="1.0" encoding="utf-8"?>
+<p:sld xmlns:a="http://schemas.openxmlformats.org/drawingml/2006/main" xmlns:r="http://schemas.openxmlformats.org/officeDocument/2006/relationships" xmlns:p="http://schemas.openxmlformats.org/presentationml/2006/main">
+  <p:cSld>
+    <p:spTree>
+      <p:nvGrpSpPr>
+        <p:cNvPr id="1" name=""/>
+        <p:cNvGrpSpPr/>
+        <p:nvPr/>
+      </p:nvGrpSpPr>
+      <p:grpSpPr>
+        <a:xfrm>
+          <a:off x="0" y="0"/>
+          <a:ext cx="0" cy="0"/>
+          <a:chOff x="0" y="0"/>
+          <a:chExt cx="0" cy="0"/>
+        </a:xfrm>
+      </p:grpSpPr>
+      <p:sp>
+        <p:nvSpPr>
+          <p:cNvPr id="2" name="Titel 1"/>
+          <p:cNvSpPr>
+            <a:spLocks noGrp="1"/>
+          </p:cNvSpPr>
+          <p:nvPr>
+            <p:ph type="title"/>
+          </p:nvPr>
+        </p:nvSpPr>
+        <p:spPr/>
+        <p:txBody>
+          <a:bodyPr/>
+          <a:lstStyle/>
+          <a:p>
+            <a:r>
+              <a:rPr lang="de-AT" dirty="0" smtClean="0"/>
               <a:t>Probleme Allgemein</a:t>
             </a:r>
             <a:endParaRPr lang="de-AT" dirty="0"/>
@@ -4451,7 +5981,7 @@
 </p:sld>
 </file>
 
-<file path=ppt/slides/slide11.xml><?xml version="1.0" encoding="utf-8"?>
+<file path=ppt/slides/slide13.xml><?xml version="1.0" encoding="utf-8"?>
 <p:sld xmlns:a="http://schemas.openxmlformats.org/drawingml/2006/main" xmlns:r="http://schemas.openxmlformats.org/officeDocument/2006/relationships" xmlns:p="http://schemas.openxmlformats.org/presentationml/2006/main">
   <p:cSld>
     <p:spTree>
@@ -4525,17 +6055,8 @@
             <a:pPr lvl="1"/>
             <a:r>
               <a:rPr lang="de-AT" dirty="0" smtClean="0"/>
-              <a:t>Interrupts werden </a:t>
-            </a:r>
-            <a:r>
-              <a:rPr lang="de-AT" smtClean="0"/>
-              <a:t>nicht </a:t>
-            </a:r>
-            <a:r>
-              <a:rPr lang="de-AT" smtClean="0"/>
-              <a:t>zurückgesetzt</a:t>
-            </a:r>
-            <a:endParaRPr lang="de-AT" dirty="0" smtClean="0"/>
+              <a:t>Interrupts werden nicht zurückgesetzt</a:t>
+            </a:r>
           </a:p>
           <a:p>
             <a:pPr lvl="1"/>
@@ -4613,6 +6134,166 @@
     <p:extLst>
       <p:ext uri="{BB962C8B-B14F-4D97-AF65-F5344CB8AC3E}">
         <p14:creationId xmlns:p14="http://schemas.microsoft.com/office/powerpoint/2010/main" val="1397337796"/>
+      </p:ext>
+    </p:extLst>
+  </p:cSld>
+  <p:clrMapOvr>
+    <a:masterClrMapping/>
+  </p:clrMapOvr>
+  <mc:AlternateContent xmlns:mc="http://schemas.openxmlformats.org/markup-compatibility/2006" xmlns:p14="http://schemas.microsoft.com/office/powerpoint/2010/main">
+    <mc:Choice Requires="p14">
+      <p:transition spd="med" p14:dur="700">
+        <p:fade/>
+      </p:transition>
+    </mc:Choice>
+    <mc:Fallback xmlns="">
+      <p:transition spd="med">
+        <p:fade/>
+      </p:transition>
+    </mc:Fallback>
+  </mc:AlternateContent>
+  <p:timing>
+    <p:tnLst>
+      <p:par>
+        <p:cTn id="1" dur="indefinite" restart="never" nodeType="tmRoot"/>
+      </p:par>
+    </p:tnLst>
+  </p:timing>
+</p:sld>
+</file>
+
+<file path=ppt/slides/slide14.xml><?xml version="1.0" encoding="utf-8"?>
+<p:sld xmlns:a="http://schemas.openxmlformats.org/drawingml/2006/main" xmlns:r="http://schemas.openxmlformats.org/officeDocument/2006/relationships" xmlns:p="http://schemas.openxmlformats.org/presentationml/2006/main">
+  <p:cSld>
+    <p:spTree>
+      <p:nvGrpSpPr>
+        <p:cNvPr id="1" name=""/>
+        <p:cNvGrpSpPr/>
+        <p:nvPr/>
+      </p:nvGrpSpPr>
+      <p:grpSpPr>
+        <a:xfrm>
+          <a:off x="0" y="0"/>
+          <a:ext cx="0" cy="0"/>
+          <a:chOff x="0" y="0"/>
+          <a:chExt cx="0" cy="0"/>
+        </a:xfrm>
+      </p:grpSpPr>
+      <p:sp>
+        <p:nvSpPr>
+          <p:cNvPr id="2" name="Titel 1"/>
+          <p:cNvSpPr>
+            <a:spLocks noGrp="1"/>
+          </p:cNvSpPr>
+          <p:nvPr>
+            <p:ph type="title"/>
+          </p:nvPr>
+        </p:nvSpPr>
+        <p:spPr/>
+        <p:txBody>
+          <a:bodyPr/>
+          <a:lstStyle/>
+          <a:p>
+            <a:r>
+              <a:rPr lang="de-AT" dirty="0" smtClean="0"/>
+              <a:t>Probleme Implementierung</a:t>
+            </a:r>
+            <a:endParaRPr lang="de-AT" dirty="0"/>
+          </a:p>
+        </p:txBody>
+      </p:sp>
+      <p:sp>
+        <p:nvSpPr>
+          <p:cNvPr id="3" name="Inhaltsplatzhalter 2"/>
+          <p:cNvSpPr>
+            <a:spLocks noGrp="1"/>
+          </p:cNvSpPr>
+          <p:nvPr>
+            <p:ph sz="quarter" idx="13"/>
+          </p:nvPr>
+        </p:nvSpPr>
+        <p:spPr/>
+        <p:txBody>
+          <a:bodyPr>
+            <a:normAutofit/>
+          </a:bodyPr>
+          <a:lstStyle/>
+          <a:p>
+            <a:r>
+              <a:rPr lang="de-AT" dirty="0"/>
+              <a:t>DMX</a:t>
+            </a:r>
+          </a:p>
+          <a:p>
+            <a:pPr lvl="1"/>
+            <a:r>
+              <a:rPr lang="de-AT" dirty="0"/>
+              <a:t>Richtige Konfiguration</a:t>
+            </a:r>
+          </a:p>
+          <a:p>
+            <a:pPr lvl="1"/>
+            <a:r>
+              <a:rPr lang="de-AT" dirty="0"/>
+              <a:t>GPIO Pin überschrieb </a:t>
+            </a:r>
+            <a:r>
+              <a:rPr lang="de-AT" dirty="0" err="1"/>
+              <a:t>Uart</a:t>
+            </a:r>
+            <a:r>
+              <a:rPr lang="de-AT" dirty="0"/>
+              <a:t> Signal</a:t>
+            </a:r>
+          </a:p>
+          <a:p>
+            <a:r>
+              <a:rPr lang="de-AT" dirty="0"/>
+              <a:t>UART</a:t>
+            </a:r>
+          </a:p>
+          <a:p>
+            <a:pPr lvl="1"/>
+            <a:r>
+              <a:rPr lang="de-AT" dirty="0"/>
+              <a:t>DMA ignorierte/überschrieb empfangen/zu sendende Daten</a:t>
+            </a:r>
+          </a:p>
+          <a:p>
+            <a:r>
+              <a:rPr lang="de-AT" dirty="0"/>
+              <a:t>Headerfiles</a:t>
+            </a:r>
+          </a:p>
+          <a:p>
+            <a:pPr lvl="1"/>
+            <a:r>
+              <a:rPr lang="de-AT" dirty="0" err="1"/>
+              <a:t>Defines</a:t>
+            </a:r>
+            <a:r>
+              <a:rPr lang="de-AT" dirty="0"/>
+              <a:t>/ </a:t>
+            </a:r>
+            <a:r>
+              <a:rPr lang="de-AT" dirty="0" err="1"/>
+              <a:t>Structs</a:t>
+            </a:r>
+            <a:r>
+              <a:rPr lang="de-AT" dirty="0"/>
+              <a:t> wurden teilweise nicht erkannt.</a:t>
+            </a:r>
+            <a:endParaRPr lang="de-AT" dirty="0" smtClean="0"/>
+          </a:p>
+          <a:p>
+            <a:endParaRPr lang="de-AT" dirty="0"/>
+          </a:p>
+        </p:txBody>
+      </p:sp>
+    </p:spTree>
+    <p:extLst>
+      <p:ext uri="{BB962C8B-B14F-4D97-AF65-F5344CB8AC3E}">
+        <p14:creationId xmlns:p14="http://schemas.microsoft.com/office/powerpoint/2010/main" val="4087801721"/>
       </p:ext>
     </p:extLst>
   </p:cSld>
@@ -5024,7 +6705,7 @@
           <p:nvPr/>
         </p:nvPicPr>
         <p:blipFill>
-          <a:blip r:embed="rId2">
+          <a:blip r:embed="rId3">
             <a:extLst>
               <a:ext uri="{28A0092B-C50C-407E-A947-70E740481C1C}">
                 <a14:useLocalDpi xmlns:a14="http://schemas.microsoft.com/office/drawing/2010/main" val="0"/>
@@ -5141,7 +6822,7 @@
         <p:spPr/>
         <p:txBody>
           <a:bodyPr>
-            <a:normAutofit/>
+            <a:normAutofit lnSpcReduction="10000"/>
           </a:bodyPr>
           <a:lstStyle/>
           <a:p>
@@ -5215,13 +6896,54 @@
             <a:pPr lvl="1"/>
             <a:r>
               <a:rPr lang="de-AT" dirty="0" smtClean="0"/>
-              <a:t>IO System</a:t>
-            </a:r>
-          </a:p>
-          <a:p>
+              <a:t>IO </a:t>
+            </a:r>
+            <a:r>
+              <a:rPr lang="de-AT" dirty="0" smtClean="0"/>
+              <a:t>System</a:t>
+            </a:r>
+          </a:p>
+          <a:p>
+            <a:r>
+              <a:rPr lang="de-AT" dirty="0"/>
+              <a:t>End-User Anwendung</a:t>
+            </a:r>
+          </a:p>
+          <a:p>
+            <a:pPr lvl="1"/>
+            <a:r>
+              <a:rPr lang="de-AT" dirty="0" err="1"/>
+              <a:t>Tik</a:t>
+            </a:r>
+            <a:r>
+              <a:rPr lang="de-AT" dirty="0"/>
+              <a:t> </a:t>
+            </a:r>
+            <a:r>
+              <a:rPr lang="de-AT" dirty="0" err="1"/>
+              <a:t>Tak</a:t>
+            </a:r>
+            <a:r>
+              <a:rPr lang="de-AT" dirty="0"/>
+              <a:t> </a:t>
+            </a:r>
+            <a:r>
+              <a:rPr lang="de-AT" dirty="0" err="1"/>
+              <a:t>Toe</a:t>
+            </a:r>
+            <a:r>
+              <a:rPr lang="de-AT" dirty="0"/>
+              <a:t> </a:t>
+            </a:r>
+          </a:p>
+          <a:p>
+            <a:pPr lvl="1"/>
             <a:endParaRPr lang="de-AT" dirty="0" smtClean="0"/>
           </a:p>
           <a:p>
+            <a:endParaRPr lang="de-AT" dirty="0" smtClean="0"/>
+          </a:p>
+          <a:p>
             <a:endParaRPr lang="de-AT" dirty="0"/>
           </a:p>
         </p:txBody>
@@ -5239,7 +6961,7 @@
         <p:spPr/>
         <p:txBody>
           <a:bodyPr>
-            <a:normAutofit/>
+            <a:normAutofit fontScale="92500" lnSpcReduction="10000"/>
           </a:bodyPr>
           <a:lstStyle/>
           <a:p>
@@ -5343,6 +7065,29 @@
               </a:rPr>
               <a:t>Loader</a:t>
             </a:r>
+            <a:endParaRPr lang="de-AT" dirty="0" smtClean="0">
+              <a:solidFill>
+                <a:schemeClr val="tx1">
+                  <a:lumMod val="50000"/>
+                </a:schemeClr>
+              </a:solidFill>
+            </a:endParaRPr>
+          </a:p>
+          <a:p>
+            <a:r>
+              <a:rPr lang="de-AT" dirty="0"/>
+              <a:t>DMX</a:t>
+            </a:r>
+          </a:p>
+          <a:p>
+            <a:pPr lvl="1"/>
+            <a:r>
+              <a:rPr lang="de-AT" dirty="0"/>
+              <a:t>Ansteuerung von Scheinwerfern</a:t>
+            </a:r>
+          </a:p>
+          <a:p>
+            <a:pPr lvl="1"/>
             <a:endParaRPr lang="de-AT" dirty="0" smtClean="0">
               <a:solidFill>
                 <a:schemeClr val="tx1">
@@ -5469,14 +7214,26 @@
           <a:p>
             <a:r>
               <a:rPr lang="de-AT" dirty="0" smtClean="0"/>
-              <a:t>DMX Treiber (RS232)</a:t>
-            </a:r>
-          </a:p>
-          <a:p>
-            <a:r>
-              <a:rPr lang="de-AT" dirty="0" smtClean="0"/>
-              <a:t>Maustreiber (RS232)</a:t>
-            </a:r>
+              <a:t>Maustreiber </a:t>
+            </a:r>
+            <a:r>
+              <a:rPr lang="de-AT" dirty="0" smtClean="0"/>
+              <a:t>(RS232</a:t>
+            </a:r>
+            <a:r>
+              <a:rPr lang="de-AT" dirty="0" smtClean="0"/>
+              <a:t>)</a:t>
+            </a:r>
+          </a:p>
+          <a:p>
+            <a:pPr lvl="1"/>
+            <a:r>
+              <a:rPr lang="de-AT" dirty="0" smtClean="0"/>
+              <a:t>KÄFERT</a:t>
+            </a:r>
+          </a:p>
+          <a:p>
+            <a:endParaRPr lang="de-AT" dirty="0" smtClean="0"/>
           </a:p>
           <a:p>
             <a:r>
@@ -5487,29 +7244,13 @@
           <a:p>
             <a:pPr lvl="1"/>
             <a:r>
-              <a:rPr lang="de-AT" dirty="0" err="1" smtClean="0"/>
-              <a:t>Tik</a:t>
-            </a:r>
-            <a:r>
-              <a:rPr lang="de-AT" dirty="0" smtClean="0"/>
-              <a:t> </a:t>
-            </a:r>
-            <a:r>
-              <a:rPr lang="de-AT" dirty="0" err="1" smtClean="0"/>
-              <a:t>Tak</a:t>
-            </a:r>
-            <a:r>
-              <a:rPr lang="de-AT" dirty="0" smtClean="0"/>
-              <a:t> </a:t>
-            </a:r>
-            <a:r>
-              <a:rPr lang="de-AT" dirty="0" err="1" smtClean="0"/>
-              <a:t>Toe</a:t>
-            </a:r>
-            <a:r>
-              <a:rPr lang="de-AT" dirty="0"/>
-              <a:t> </a:t>
-            </a:r>
+              <a:rPr lang="de-AT" dirty="0" smtClean="0"/>
+              <a:t>Maus-Steuerung</a:t>
+            </a:r>
+          </a:p>
+          <a:p>
+            <a:pPr lvl="1"/>
+            <a:endParaRPr lang="de-AT" dirty="0"/>
           </a:p>
         </p:txBody>
       </p:sp>
@@ -5606,6 +7347,328 @@
       </p:grpSpPr>
       <p:sp>
         <p:nvSpPr>
+          <p:cNvPr id="2" name="Titel 1"/>
+          <p:cNvSpPr>
+            <a:spLocks noGrp="1"/>
+          </p:cNvSpPr>
+          <p:nvPr>
+            <p:ph type="title"/>
+          </p:nvPr>
+        </p:nvSpPr>
+        <p:spPr/>
+        <p:txBody>
+          <a:bodyPr/>
+          <a:lstStyle/>
+          <a:p>
+            <a:r>
+              <a:rPr lang="de-AT" dirty="0" smtClean="0"/>
+              <a:t>Änderungswünsche</a:t>
+            </a:r>
+            <a:endParaRPr lang="de-AT" dirty="0"/>
+          </a:p>
+        </p:txBody>
+      </p:sp>
+      <p:sp>
+        <p:nvSpPr>
+          <p:cNvPr id="3" name="Inhaltsplatzhalter 2"/>
+          <p:cNvSpPr>
+            <a:spLocks noGrp="1"/>
+          </p:cNvSpPr>
+          <p:nvPr>
+            <p:ph sz="quarter" idx="13"/>
+          </p:nvPr>
+        </p:nvSpPr>
+        <p:spPr/>
+        <p:txBody>
+          <a:bodyPr/>
+          <a:lstStyle/>
+          <a:p>
+            <a:r>
+              <a:rPr lang="de-AT" dirty="0" smtClean="0"/>
+              <a:t>Gerät als Datei (ähnlich wie Linux)</a:t>
+            </a:r>
+          </a:p>
+          <a:p>
+            <a:pPr lvl="1"/>
+            <a:r>
+              <a:rPr lang="de-AT" dirty="0" smtClean="0"/>
+              <a:t>Bessere Abstraktion als mit Gerätenummern</a:t>
+            </a:r>
+          </a:p>
+          <a:p>
+            <a:pPr lvl="1"/>
+            <a:r>
+              <a:rPr lang="de-AT" dirty="0" smtClean="0"/>
+              <a:t>Mögliche Implementierung</a:t>
+            </a:r>
+          </a:p>
+          <a:p>
+            <a:pPr lvl="2"/>
+            <a:r>
+              <a:rPr lang="de-AT" dirty="0" smtClean="0"/>
+              <a:t>Neuer Mount-Treiber welcher an das Device-System </a:t>
+            </a:r>
+            <a:r>
+              <a:rPr lang="de-AT" dirty="0" smtClean="0"/>
+              <a:t>delegiert</a:t>
+            </a:r>
+          </a:p>
+          <a:p>
+            <a:r>
+              <a:rPr lang="de-AT" dirty="0" smtClean="0"/>
+              <a:t>UART Treiber</a:t>
+            </a:r>
+          </a:p>
+          <a:p>
+            <a:pPr lvl="1"/>
+            <a:r>
+              <a:rPr lang="de-AT" dirty="0" smtClean="0"/>
+              <a:t>Sollte beim Lesen nicht das ganze System blockieren</a:t>
+            </a:r>
+          </a:p>
+          <a:p>
+            <a:pPr lvl="1"/>
+            <a:r>
+              <a:rPr lang="de-AT" dirty="0" smtClean="0"/>
+              <a:t>Bei der Verbindung zwischen einem C# Programm dubiose Eingabewerte.</a:t>
+            </a:r>
+          </a:p>
+          <a:p>
+            <a:pPr lvl="1"/>
+            <a:endParaRPr lang="de-AT" dirty="0" smtClean="0"/>
+          </a:p>
+          <a:p>
+            <a:pPr lvl="1"/>
+            <a:endParaRPr lang="de-AT" dirty="0" smtClean="0"/>
+          </a:p>
+        </p:txBody>
+      </p:sp>
+    </p:spTree>
+    <p:extLst>
+      <p:ext uri="{BB962C8B-B14F-4D97-AF65-F5344CB8AC3E}">
+        <p14:creationId xmlns:p14="http://schemas.microsoft.com/office/powerpoint/2010/main" val="1618156881"/>
+      </p:ext>
+    </p:extLst>
+  </p:cSld>
+  <p:clrMapOvr>
+    <a:masterClrMapping/>
+  </p:clrMapOvr>
+  <mc:AlternateContent xmlns:mc="http://schemas.openxmlformats.org/markup-compatibility/2006" xmlns:p14="http://schemas.microsoft.com/office/powerpoint/2010/main">
+    <mc:Choice Requires="p14">
+      <p:transition spd="med" p14:dur="700">
+        <p:fade/>
+      </p:transition>
+    </mc:Choice>
+    <mc:Fallback xmlns="">
+      <p:transition spd="med">
+        <p:fade/>
+      </p:transition>
+    </mc:Fallback>
+  </mc:AlternateContent>
+  <p:timing>
+    <p:tnLst>
+      <p:par>
+        <p:cTn id="1" dur="indefinite" restart="never" nodeType="tmRoot"/>
+      </p:par>
+    </p:tnLst>
+  </p:timing>
+</p:sld>
+</file>
+
+<file path=ppt/slides/slide7.xml><?xml version="1.0" encoding="utf-8"?>
+<p:sld xmlns:a="http://schemas.openxmlformats.org/drawingml/2006/main" xmlns:r="http://schemas.openxmlformats.org/officeDocument/2006/relationships" xmlns:p="http://schemas.openxmlformats.org/presentationml/2006/main">
+  <p:cSld>
+    <p:spTree>
+      <p:nvGrpSpPr>
+        <p:cNvPr id="1" name=""/>
+        <p:cNvGrpSpPr/>
+        <p:nvPr/>
+      </p:nvGrpSpPr>
+      <p:grpSpPr>
+        <a:xfrm>
+          <a:off x="0" y="0"/>
+          <a:ext cx="0" cy="0"/>
+          <a:chOff x="0" y="0"/>
+          <a:chExt cx="0" cy="0"/>
+        </a:xfrm>
+      </p:grpSpPr>
+      <p:sp>
+        <p:nvSpPr>
+          <p:cNvPr id="2" name="Titel 1"/>
+          <p:cNvSpPr>
+            <a:spLocks noGrp="1"/>
+          </p:cNvSpPr>
+          <p:nvPr>
+            <p:ph type="title"/>
+          </p:nvPr>
+        </p:nvSpPr>
+        <p:spPr/>
+        <p:txBody>
+          <a:bodyPr/>
+          <a:lstStyle/>
+          <a:p>
+            <a:r>
+              <a:rPr lang="de-AT" dirty="0" smtClean="0"/>
+              <a:t>Aufbau der End-User Applikation </a:t>
+            </a:r>
+            <a:endParaRPr lang="de-AT" dirty="0"/>
+          </a:p>
+        </p:txBody>
+      </p:sp>
+      <p:sp>
+        <p:nvSpPr>
+          <p:cNvPr id="3" name="Inhaltsplatzhalter 2"/>
+          <p:cNvSpPr>
+            <a:spLocks noGrp="1"/>
+          </p:cNvSpPr>
+          <p:nvPr>
+            <p:ph sz="quarter" idx="13"/>
+          </p:nvPr>
+        </p:nvSpPr>
+        <p:spPr/>
+        <p:txBody>
+          <a:bodyPr/>
+          <a:lstStyle/>
+          <a:p>
+            <a:r>
+              <a:rPr lang="de-AT" dirty="0" smtClean="0"/>
+              <a:t>Maus-Steuerung </a:t>
+            </a:r>
+            <a:r>
+              <a:rPr lang="de-AT" dirty="0" smtClean="0"/>
+              <a:t>über </a:t>
+            </a:r>
+            <a:r>
+              <a:rPr lang="de-AT" dirty="0" smtClean="0"/>
+              <a:t>UART</a:t>
+            </a:r>
+          </a:p>
+          <a:p>
+            <a:pPr lvl="1"/>
+            <a:r>
+              <a:rPr lang="de-AT" dirty="0" smtClean="0"/>
+              <a:t>Alternative Eingabe über Konsole</a:t>
+            </a:r>
+            <a:endParaRPr lang="de-AT" dirty="0" smtClean="0"/>
+          </a:p>
+          <a:p>
+            <a:r>
+              <a:rPr lang="de-AT" dirty="0" smtClean="0"/>
+              <a:t>Anzeige über </a:t>
+            </a:r>
+            <a:r>
+              <a:rPr lang="de-AT" dirty="0" smtClean="0"/>
+              <a:t>HDMI</a:t>
+            </a:r>
+          </a:p>
+          <a:p>
+            <a:endParaRPr lang="de-AT" dirty="0" smtClean="0"/>
+          </a:p>
+          <a:p>
+            <a:endParaRPr lang="de-AT" dirty="0"/>
+          </a:p>
+          <a:p>
+            <a:r>
+              <a:rPr lang="de-AT" dirty="0" smtClean="0"/>
+              <a:t>Problem: Langsamer Aufbau des angezeigten Bildes. Somit </a:t>
+            </a:r>
+            <a:r>
+              <a:rPr lang="de-AT" dirty="0" smtClean="0"/>
+              <a:t>Maus-Steuerung </a:t>
+            </a:r>
+            <a:r>
+              <a:rPr lang="de-AT" dirty="0" smtClean="0"/>
+              <a:t>momentan nicht anwendbar</a:t>
+            </a:r>
+            <a:endParaRPr lang="de-AT" dirty="0"/>
+          </a:p>
+        </p:txBody>
+      </p:sp>
+      <p:pic>
+        <p:nvPicPr>
+          <p:cNvPr id="1027" name="Picture 3" descr="C:\Users\Matthias Amann\Matthias\FH\Master\ITM2\S1-Beschraenkte Maschinen\TicTacToe2.jpg"/>
+          <p:cNvPicPr>
+            <a:picLocks noChangeAspect="1" noChangeArrowheads="1"/>
+          </p:cNvPicPr>
+          <p:nvPr/>
+        </p:nvPicPr>
+        <p:blipFill>
+          <a:blip r:embed="rId3" cstate="print">
+            <a:extLst>
+              <a:ext uri="{28A0092B-C50C-407E-A947-70E740481C1C}">
+                <a14:useLocalDpi xmlns:a14="http://schemas.microsoft.com/office/drawing/2010/main" val="0"/>
+              </a:ext>
+            </a:extLst>
+          </a:blip>
+          <a:srcRect/>
+          <a:stretch>
+            <a:fillRect/>
+          </a:stretch>
+        </p:blipFill>
+        <p:spPr bwMode="auto">
+          <a:xfrm>
+            <a:off x="5940152" y="1061370"/>
+            <a:ext cx="2232248" cy="1674186"/>
+          </a:xfrm>
+          <a:prstGeom prst="rect">
+            <a:avLst/>
+          </a:prstGeom>
+          <a:noFill/>
+          <a:extLst>
+            <a:ext uri="{909E8E84-426E-40DD-AFC4-6F175D3DCCD1}">
+              <a14:hiddenFill xmlns:a14="http://schemas.microsoft.com/office/drawing/2010/main">
+                <a:solidFill>
+                  <a:srgbClr val="FFFFFF"/>
+                </a:solidFill>
+              </a14:hiddenFill>
+            </a:ext>
+          </a:extLst>
+        </p:spPr>
+      </p:pic>
+    </p:spTree>
+    <p:extLst>
+      <p:ext uri="{BB962C8B-B14F-4D97-AF65-F5344CB8AC3E}">
+        <p14:creationId xmlns:p14="http://schemas.microsoft.com/office/powerpoint/2010/main" val="68171212"/>
+      </p:ext>
+    </p:extLst>
+  </p:cSld>
+  <p:clrMapOvr>
+    <a:masterClrMapping/>
+  </p:clrMapOvr>
+  <mc:AlternateContent xmlns:mc="http://schemas.openxmlformats.org/markup-compatibility/2006" xmlns:p14="http://schemas.microsoft.com/office/powerpoint/2010/main">
+    <mc:Choice Requires="p14">
+      <p:transition spd="med" p14:dur="700">
+        <p:fade/>
+      </p:transition>
+    </mc:Choice>
+    <mc:Fallback xmlns="">
+      <p:transition spd="med">
+        <p:fade/>
+      </p:transition>
+    </mc:Fallback>
+  </mc:AlternateContent>
+</p:sld>
+</file>
+
+<file path=ppt/slides/slide8.xml><?xml version="1.0" encoding="utf-8"?>
+<p:sld xmlns:a="http://schemas.openxmlformats.org/drawingml/2006/main" xmlns:r="http://schemas.openxmlformats.org/officeDocument/2006/relationships" xmlns:p="http://schemas.openxmlformats.org/presentationml/2006/main">
+  <p:cSld>
+    <p:spTree>
+      <p:nvGrpSpPr>
+        <p:cNvPr id="1" name=""/>
+        <p:cNvGrpSpPr/>
+        <p:nvPr/>
+      </p:nvGrpSpPr>
+      <p:grpSpPr>
+        <a:xfrm>
+          <a:off x="0" y="0"/>
+          <a:ext cx="0" cy="0"/>
+          <a:chOff x="0" y="0"/>
+          <a:chExt cx="0" cy="0"/>
+        </a:xfrm>
+      </p:grpSpPr>
+      <p:sp>
+        <p:nvSpPr>
           <p:cNvPr id="5" name="Titel 4"/>
           <p:cNvSpPr>
             <a:spLocks noGrp="1"/>
@@ -5666,7 +7729,7 @@
           <p:nvPr/>
         </p:nvPicPr>
         <p:blipFill>
-          <a:blip r:embed="rId2">
+          <a:blip r:embed="rId3">
             <a:extLst>
               <a:ext uri="{28A0092B-C50C-407E-A947-70E740481C1C}">
                 <a14:useLocalDpi xmlns:a14="http://schemas.microsoft.com/office/drawing/2010/main" val="0"/>
@@ -5753,384 +7816,6 @@
 </p:sld>
 </file>
 
-<file path=ppt/slides/slide7.xml><?xml version="1.0" encoding="utf-8"?>
-<p:sld xmlns:a="http://schemas.openxmlformats.org/drawingml/2006/main" xmlns:r="http://schemas.openxmlformats.org/officeDocument/2006/relationships" xmlns:p="http://schemas.openxmlformats.org/presentationml/2006/main">
-  <p:cSld>
-    <p:spTree>
-      <p:nvGrpSpPr>
-        <p:cNvPr id="1" name=""/>
-        <p:cNvGrpSpPr/>
-        <p:nvPr/>
-      </p:nvGrpSpPr>
-      <p:grpSpPr>
-        <a:xfrm>
-          <a:off x="0" y="0"/>
-          <a:ext cx="0" cy="0"/>
-          <a:chOff x="0" y="0"/>
-          <a:chExt cx="0" cy="0"/>
-        </a:xfrm>
-      </p:grpSpPr>
-      <p:sp>
-        <p:nvSpPr>
-          <p:cNvPr id="2" name="Titel 1"/>
-          <p:cNvSpPr>
-            <a:spLocks noGrp="1"/>
-          </p:cNvSpPr>
-          <p:nvPr>
-            <p:ph type="title"/>
-          </p:nvPr>
-        </p:nvSpPr>
-        <p:spPr/>
-        <p:txBody>
-          <a:bodyPr/>
-          <a:lstStyle/>
-          <a:p>
-            <a:r>
-              <a:rPr lang="de-AT" dirty="0" smtClean="0"/>
-              <a:t>Geräteinteraktion</a:t>
-            </a:r>
-            <a:endParaRPr lang="de-AT" dirty="0"/>
-          </a:p>
-        </p:txBody>
-      </p:sp>
-      <p:sp>
-        <p:nvSpPr>
-          <p:cNvPr id="3" name="Inhaltsplatzhalter 2"/>
-          <p:cNvSpPr>
-            <a:spLocks noGrp="1"/>
-          </p:cNvSpPr>
-          <p:nvPr>
-            <p:ph sz="quarter" idx="13"/>
-          </p:nvPr>
-        </p:nvSpPr>
-        <p:spPr/>
-        <p:txBody>
-          <a:bodyPr>
-            <a:normAutofit/>
-          </a:bodyPr>
-          <a:lstStyle/>
-          <a:p>
-            <a:r>
-              <a:rPr lang="de-AT" dirty="0" err="1" smtClean="0"/>
-              <a:t>api_device_build_id</a:t>
-            </a:r>
-            <a:r>
-              <a:rPr lang="de-AT" dirty="0" smtClean="0"/>
-              <a:t>(</a:t>
-            </a:r>
-            <a:r>
-              <a:rPr lang="de-AT" dirty="0" err="1" smtClean="0"/>
-              <a:t>deviceType</a:t>
-            </a:r>
-            <a:r>
-              <a:rPr lang="de-AT" dirty="0" smtClean="0"/>
-              <a:t>, </a:t>
-            </a:r>
-            <a:r>
-              <a:rPr lang="de-AT" dirty="0" err="1" smtClean="0"/>
-              <a:t>index</a:t>
-            </a:r>
-            <a:r>
-              <a:rPr lang="de-AT" dirty="0" smtClean="0"/>
-              <a:t>)</a:t>
-            </a:r>
-          </a:p>
-          <a:p>
-            <a:pPr lvl="1"/>
-            <a:r>
-              <a:rPr lang="de-AT" dirty="0" smtClean="0"/>
-              <a:t>Generiert eine Device-ID für die anderen Device Operationen</a:t>
-            </a:r>
-          </a:p>
-          <a:p>
-            <a:r>
-              <a:rPr lang="de-AT" dirty="0" err="1" smtClean="0"/>
-              <a:t>api_device_open</a:t>
-            </a:r>
-            <a:r>
-              <a:rPr lang="de-AT" dirty="0" smtClean="0"/>
-              <a:t>(</a:t>
-            </a:r>
-            <a:r>
-              <a:rPr lang="de-AT" dirty="0" err="1" smtClean="0"/>
-              <a:t>deviceId</a:t>
-            </a:r>
-            <a:r>
-              <a:rPr lang="de-AT" dirty="0" smtClean="0"/>
-              <a:t>)</a:t>
-            </a:r>
-          </a:p>
-          <a:p>
-            <a:pPr lvl="1"/>
-            <a:r>
-              <a:rPr lang="de-AT" dirty="0" smtClean="0"/>
-              <a:t>Öffnet ein </a:t>
-            </a:r>
-            <a:r>
-              <a:rPr lang="de-AT" dirty="0" err="1" smtClean="0"/>
-              <a:t>device_handle_t</a:t>
-            </a:r>
-            <a:r>
-              <a:rPr lang="de-AT" dirty="0" smtClean="0"/>
-              <a:t> zum Gerät</a:t>
-            </a:r>
-          </a:p>
-          <a:p>
-            <a:r>
-              <a:rPr lang="de-AT" dirty="0" err="1" smtClean="0"/>
-              <a:t>api_device_read</a:t>
-            </a:r>
-            <a:r>
-              <a:rPr lang="de-AT" dirty="0" smtClean="0"/>
-              <a:t>(handle, </a:t>
-            </a:r>
-            <a:r>
-              <a:rPr lang="de-AT" dirty="0" err="1" smtClean="0"/>
-              <a:t>buffer</a:t>
-            </a:r>
-            <a:r>
-              <a:rPr lang="de-AT" dirty="0" smtClean="0"/>
-              <a:t>, </a:t>
-            </a:r>
-            <a:r>
-              <a:rPr lang="de-AT" dirty="0" err="1" smtClean="0"/>
-              <a:t>count</a:t>
-            </a:r>
-            <a:r>
-              <a:rPr lang="de-AT" dirty="0" smtClean="0"/>
-              <a:t>)</a:t>
-            </a:r>
-          </a:p>
-          <a:p>
-            <a:pPr lvl="1"/>
-            <a:r>
-              <a:rPr lang="de-AT" dirty="0" smtClean="0"/>
-              <a:t>Füllt einen </a:t>
-            </a:r>
-            <a:r>
-              <a:rPr lang="de-AT" dirty="0" err="1" smtClean="0"/>
-              <a:t>Buffer</a:t>
-            </a:r>
-            <a:r>
-              <a:rPr lang="de-AT" dirty="0" smtClean="0"/>
-              <a:t> vom Gerät</a:t>
-            </a:r>
-          </a:p>
-          <a:p>
-            <a:r>
-              <a:rPr lang="de-AT" dirty="0" err="1" smtClean="0"/>
-              <a:t>api_device_write</a:t>
-            </a:r>
-            <a:r>
-              <a:rPr lang="de-AT" dirty="0" smtClean="0"/>
-              <a:t>(handle, </a:t>
-            </a:r>
-            <a:r>
-              <a:rPr lang="de-AT" dirty="0" err="1" smtClean="0"/>
-              <a:t>buffer</a:t>
-            </a:r>
-            <a:r>
-              <a:rPr lang="de-AT" dirty="0" smtClean="0"/>
-              <a:t>, </a:t>
-            </a:r>
-            <a:r>
-              <a:rPr lang="de-AT" dirty="0" err="1" smtClean="0"/>
-              <a:t>count</a:t>
-            </a:r>
-            <a:r>
-              <a:rPr lang="de-AT" dirty="0" smtClean="0"/>
-              <a:t>)</a:t>
-            </a:r>
-          </a:p>
-          <a:p>
-            <a:pPr lvl="1"/>
-            <a:r>
-              <a:rPr lang="de-AT" dirty="0" smtClean="0"/>
-              <a:t>Schreibt einen </a:t>
-            </a:r>
-            <a:r>
-              <a:rPr lang="de-AT" dirty="0" err="1" smtClean="0"/>
-              <a:t>Buffer</a:t>
-            </a:r>
-            <a:r>
-              <a:rPr lang="de-AT" dirty="0" smtClean="0"/>
-              <a:t> zum Gerät</a:t>
-            </a:r>
-          </a:p>
-          <a:p>
-            <a:r>
-              <a:rPr lang="de-AT" dirty="0" err="1" smtClean="0"/>
-              <a:t>api_device_ioclt</a:t>
-            </a:r>
-            <a:r>
-              <a:rPr lang="de-AT" dirty="0" smtClean="0"/>
-              <a:t>(handle, </a:t>
-            </a:r>
-            <a:r>
-              <a:rPr lang="de-AT" dirty="0" err="1" smtClean="0"/>
-              <a:t>cmd</a:t>
-            </a:r>
-            <a:r>
-              <a:rPr lang="de-AT" dirty="0" smtClean="0"/>
-              <a:t>, arg)</a:t>
-            </a:r>
-          </a:p>
-          <a:p>
-            <a:pPr lvl="1"/>
-            <a:r>
-              <a:rPr lang="de-AT" dirty="0" smtClean="0"/>
-              <a:t>Schickt einen gerätespezifischen Befehl</a:t>
-            </a:r>
-          </a:p>
-        </p:txBody>
-      </p:sp>
-    </p:spTree>
-    <p:extLst>
-      <p:ext uri="{BB962C8B-B14F-4D97-AF65-F5344CB8AC3E}">
-        <p14:creationId xmlns:p14="http://schemas.microsoft.com/office/powerpoint/2010/main" val="3237128239"/>
-      </p:ext>
-    </p:extLst>
-  </p:cSld>
-  <p:clrMapOvr>
-    <a:masterClrMapping/>
-  </p:clrMapOvr>
-  <mc:AlternateContent xmlns:mc="http://schemas.openxmlformats.org/markup-compatibility/2006" xmlns:p14="http://schemas.microsoft.com/office/powerpoint/2010/main">
-    <mc:Choice Requires="p14">
-      <p:transition spd="med" p14:dur="700">
-        <p:fade/>
-      </p:transition>
-    </mc:Choice>
-    <mc:Fallback xmlns="">
-      <p:transition spd="med">
-        <p:fade/>
-      </p:transition>
-    </mc:Fallback>
-  </mc:AlternateContent>
-  <p:timing>
-    <p:tnLst>
-      <p:par>
-        <p:cTn id="1" dur="indefinite" restart="never" nodeType="tmRoot"/>
-      </p:par>
-    </p:tnLst>
-  </p:timing>
-</p:sld>
-</file>
-
-<file path=ppt/slides/slide8.xml><?xml version="1.0" encoding="utf-8"?>
-<p:sld xmlns:a="http://schemas.openxmlformats.org/drawingml/2006/main" xmlns:r="http://schemas.openxmlformats.org/officeDocument/2006/relationships" xmlns:p="http://schemas.openxmlformats.org/presentationml/2006/main">
-  <p:cSld>
-    <p:spTree>
-      <p:nvGrpSpPr>
-        <p:cNvPr id="1" name=""/>
-        <p:cNvGrpSpPr/>
-        <p:nvPr/>
-      </p:nvGrpSpPr>
-      <p:grpSpPr>
-        <a:xfrm>
-          <a:off x="0" y="0"/>
-          <a:ext cx="0" cy="0"/>
-          <a:chOff x="0" y="0"/>
-          <a:chExt cx="0" cy="0"/>
-        </a:xfrm>
-      </p:grpSpPr>
-      <p:sp>
-        <p:nvSpPr>
-          <p:cNvPr id="2" name="Titel 1"/>
-          <p:cNvSpPr>
-            <a:spLocks noGrp="1"/>
-          </p:cNvSpPr>
-          <p:nvPr>
-            <p:ph type="title"/>
-          </p:nvPr>
-        </p:nvSpPr>
-        <p:spPr/>
-        <p:txBody>
-          <a:bodyPr/>
-          <a:lstStyle/>
-          <a:p>
-            <a:r>
-              <a:rPr lang="de-AT" dirty="0" smtClean="0"/>
-              <a:t>Änderungswünsche</a:t>
-            </a:r>
-            <a:endParaRPr lang="de-AT" dirty="0"/>
-          </a:p>
-        </p:txBody>
-      </p:sp>
-      <p:sp>
-        <p:nvSpPr>
-          <p:cNvPr id="3" name="Inhaltsplatzhalter 2"/>
-          <p:cNvSpPr>
-            <a:spLocks noGrp="1"/>
-          </p:cNvSpPr>
-          <p:nvPr>
-            <p:ph sz="quarter" idx="13"/>
-          </p:nvPr>
-        </p:nvSpPr>
-        <p:spPr/>
-        <p:txBody>
-          <a:bodyPr/>
-          <a:lstStyle/>
-          <a:p>
-            <a:r>
-              <a:rPr lang="de-AT" dirty="0" smtClean="0"/>
-              <a:t>Gerät als Datei (ähnlich wie Linux)</a:t>
-            </a:r>
-          </a:p>
-          <a:p>
-            <a:pPr lvl="1"/>
-            <a:r>
-              <a:rPr lang="de-AT" dirty="0" smtClean="0"/>
-              <a:t>Bessere Abstraktion als mit Gerätenummern</a:t>
-            </a:r>
-          </a:p>
-          <a:p>
-            <a:pPr lvl="1"/>
-            <a:r>
-              <a:rPr lang="de-AT" dirty="0" smtClean="0"/>
-              <a:t>Mögliche Implementierung</a:t>
-            </a:r>
-          </a:p>
-          <a:p>
-            <a:pPr lvl="2"/>
-            <a:r>
-              <a:rPr lang="de-AT" dirty="0" smtClean="0"/>
-              <a:t>Neuer Mount-Treiber welcher an das Device-System delegiert</a:t>
-            </a:r>
-          </a:p>
-        </p:txBody>
-      </p:sp>
-    </p:spTree>
-    <p:extLst>
-      <p:ext uri="{BB962C8B-B14F-4D97-AF65-F5344CB8AC3E}">
-        <p14:creationId xmlns:p14="http://schemas.microsoft.com/office/powerpoint/2010/main" val="1618156881"/>
-      </p:ext>
-    </p:extLst>
-  </p:cSld>
-  <p:clrMapOvr>
-    <a:masterClrMapping/>
-  </p:clrMapOvr>
-  <mc:AlternateContent xmlns:mc="http://schemas.openxmlformats.org/markup-compatibility/2006" xmlns:p14="http://schemas.microsoft.com/office/powerpoint/2010/main">
-    <mc:Choice Requires="p14">
-      <p:transition spd="med" p14:dur="700">
-        <p:fade/>
-      </p:transition>
-    </mc:Choice>
-    <mc:Fallback xmlns="">
-      <p:transition spd="med">
-        <p:fade/>
-      </p:transition>
-    </mc:Fallback>
-  </mc:AlternateContent>
-  <p:timing>
-    <p:tnLst>
-      <p:par>
-        <p:cTn id="1" dur="indefinite" restart="never" nodeType="tmRoot"/>
-      </p:par>
-    </p:tnLst>
-  </p:timing>
-</p:sld>
-</file>
-
 <file path=ppt/slides/slide9.xml><?xml version="1.0" encoding="utf-8"?>
 <p:sld xmlns:a="http://schemas.openxmlformats.org/drawingml/2006/main" xmlns:r="http://schemas.openxmlformats.org/officeDocument/2006/relationships" xmlns:p="http://schemas.openxmlformats.org/presentationml/2006/main">
   <p:cSld>
@@ -6165,80 +7850,207 @@
           <a:p>
             <a:r>
               <a:rPr lang="de-AT" dirty="0" smtClean="0"/>
-              <a:t>IO System</a:t>
+              <a:t>Geräteinteraktion</a:t>
             </a:r>
             <a:endParaRPr lang="de-AT" dirty="0"/>
           </a:p>
         </p:txBody>
       </p:sp>
-      <p:pic>
-        <p:nvPicPr>
-          <p:cNvPr id="3076" name="Picture 4"/>
-          <p:cNvPicPr>
-            <a:picLocks noChangeAspect="1" noChangeArrowheads="1"/>
-          </p:cNvPicPr>
-          <p:nvPr/>
-        </p:nvPicPr>
-        <p:blipFill>
-          <a:blip r:embed="rId2">
-            <a:extLst>
-              <a:ext uri="{28A0092B-C50C-407E-A947-70E740481C1C}">
-                <a14:useLocalDpi xmlns:a14="http://schemas.microsoft.com/office/drawing/2010/main" val="0"/>
-              </a:ext>
-            </a:extLst>
-          </a:blip>
-          <a:srcRect/>
-          <a:stretch>
-            <a:fillRect/>
-          </a:stretch>
-        </p:blipFill>
-        <p:spPr bwMode="auto">
-          <a:xfrm>
-            <a:off x="744116" y="1052736"/>
-            <a:ext cx="7594736" cy="5042694"/>
-          </a:xfrm>
-          <a:prstGeom prst="rect">
-            <a:avLst/>
-          </a:prstGeom>
-          <a:noFill/>
-          <a:ln>
-            <a:noFill/>
-          </a:ln>
-          <a:effectLst/>
-          <a:extLst>
-            <a:ext uri="{909E8E84-426E-40DD-AFC4-6F175D3DCCD1}">
-              <a14:hiddenFill xmlns:a14="http://schemas.microsoft.com/office/drawing/2010/main">
-                <a:solidFill>
-                  <a:schemeClr val="accent1"/>
-                </a:solidFill>
-              </a14:hiddenFill>
-            </a:ext>
-            <a:ext uri="{91240B29-F687-4F45-9708-019B960494DF}">
-              <a14:hiddenLine xmlns:a14="http://schemas.microsoft.com/office/drawing/2010/main" w="9525">
-                <a:solidFill>
-                  <a:schemeClr val="tx1"/>
-                </a:solidFill>
-                <a:miter lim="800000"/>
-                <a:headEnd/>
-                <a:tailEnd/>
-              </a14:hiddenLine>
-            </a:ext>
-            <a:ext uri="{AF507438-7753-43E0-B8FC-AC1667EBCBE1}">
-              <a14:hiddenEffects xmlns:a14="http://schemas.microsoft.com/office/drawing/2010/main">
-                <a:effectLst>
-                  <a:outerShdw dist="35921" dir="2700000" algn="ctr" rotWithShape="0">
-                    <a:schemeClr val="bg2"/>
-                  </a:outerShdw>
-                </a:effectLst>
-              </a14:hiddenEffects>
-            </a:ext>
-          </a:extLst>
-        </p:spPr>
-      </p:pic>
+      <p:sp>
+        <p:nvSpPr>
+          <p:cNvPr id="3" name="Inhaltsplatzhalter 2"/>
+          <p:cNvSpPr>
+            <a:spLocks noGrp="1"/>
+          </p:cNvSpPr>
+          <p:nvPr>
+            <p:ph sz="quarter" idx="13"/>
+          </p:nvPr>
+        </p:nvSpPr>
+        <p:spPr/>
+        <p:txBody>
+          <a:bodyPr>
+            <a:normAutofit/>
+          </a:bodyPr>
+          <a:lstStyle/>
+          <a:p>
+            <a:r>
+              <a:rPr lang="de-AT" dirty="0" err="1" smtClean="0"/>
+              <a:t>api_device_build_id</a:t>
+            </a:r>
+            <a:r>
+              <a:rPr lang="de-AT" dirty="0" smtClean="0"/>
+              <a:t>(</a:t>
+            </a:r>
+            <a:r>
+              <a:rPr lang="de-AT" dirty="0" err="1" smtClean="0"/>
+              <a:t>deviceType</a:t>
+            </a:r>
+            <a:r>
+              <a:rPr lang="de-AT" dirty="0" smtClean="0"/>
+              <a:t>, </a:t>
+            </a:r>
+            <a:r>
+              <a:rPr lang="de-AT" dirty="0" err="1" smtClean="0"/>
+              <a:t>index</a:t>
+            </a:r>
+            <a:r>
+              <a:rPr lang="de-AT" dirty="0" smtClean="0"/>
+              <a:t>)</a:t>
+            </a:r>
+          </a:p>
+          <a:p>
+            <a:pPr lvl="1"/>
+            <a:r>
+              <a:rPr lang="de-AT" dirty="0" smtClean="0"/>
+              <a:t>Generiert eine Device-ID für die anderen Device Operationen</a:t>
+            </a:r>
+          </a:p>
+          <a:p>
+            <a:r>
+              <a:rPr lang="de-AT" dirty="0" err="1" smtClean="0"/>
+              <a:t>api_device_open</a:t>
+            </a:r>
+            <a:r>
+              <a:rPr lang="de-AT" dirty="0" smtClean="0"/>
+              <a:t>(</a:t>
+            </a:r>
+            <a:r>
+              <a:rPr lang="de-AT" dirty="0" err="1" smtClean="0"/>
+              <a:t>deviceId</a:t>
+            </a:r>
+            <a:r>
+              <a:rPr lang="de-AT" dirty="0" smtClean="0"/>
+              <a:t>)</a:t>
+            </a:r>
+          </a:p>
+          <a:p>
+            <a:pPr lvl="1"/>
+            <a:r>
+              <a:rPr lang="de-AT" dirty="0" smtClean="0"/>
+              <a:t>Öffnet ein </a:t>
+            </a:r>
+            <a:r>
+              <a:rPr lang="de-AT" dirty="0" err="1" smtClean="0"/>
+              <a:t>device_handle_t</a:t>
+            </a:r>
+            <a:r>
+              <a:rPr lang="de-AT" dirty="0" smtClean="0"/>
+              <a:t> zum Gerät</a:t>
+            </a:r>
+          </a:p>
+          <a:p>
+            <a:r>
+              <a:rPr lang="de-AT" dirty="0" err="1" smtClean="0"/>
+              <a:t>api_device_read</a:t>
+            </a:r>
+            <a:r>
+              <a:rPr lang="de-AT" dirty="0" smtClean="0"/>
+              <a:t>(handle, </a:t>
+            </a:r>
+            <a:r>
+              <a:rPr lang="de-AT" dirty="0" err="1" smtClean="0"/>
+              <a:t>buffer</a:t>
+            </a:r>
+            <a:r>
+              <a:rPr lang="de-AT" dirty="0" smtClean="0"/>
+              <a:t>, </a:t>
+            </a:r>
+            <a:r>
+              <a:rPr lang="de-AT" dirty="0" err="1" smtClean="0"/>
+              <a:t>count</a:t>
+            </a:r>
+            <a:r>
+              <a:rPr lang="de-AT" dirty="0" smtClean="0"/>
+              <a:t>)</a:t>
+            </a:r>
+          </a:p>
+          <a:p>
+            <a:pPr lvl="1"/>
+            <a:r>
+              <a:rPr lang="de-AT" dirty="0" smtClean="0"/>
+              <a:t>Füllt einen </a:t>
+            </a:r>
+            <a:r>
+              <a:rPr lang="de-AT" dirty="0" err="1" smtClean="0"/>
+              <a:t>Buffer</a:t>
+            </a:r>
+            <a:r>
+              <a:rPr lang="de-AT" dirty="0" smtClean="0"/>
+              <a:t> vom Gerät</a:t>
+            </a:r>
+          </a:p>
+          <a:p>
+            <a:r>
+              <a:rPr lang="de-AT" dirty="0" err="1" smtClean="0"/>
+              <a:t>api_device_write</a:t>
+            </a:r>
+            <a:r>
+              <a:rPr lang="de-AT" dirty="0" smtClean="0"/>
+              <a:t>(handle, </a:t>
+            </a:r>
+            <a:r>
+              <a:rPr lang="de-AT" dirty="0" err="1" smtClean="0"/>
+              <a:t>buffer</a:t>
+            </a:r>
+            <a:r>
+              <a:rPr lang="de-AT" dirty="0" smtClean="0"/>
+              <a:t>, </a:t>
+            </a:r>
+            <a:r>
+              <a:rPr lang="de-AT" dirty="0" err="1" smtClean="0"/>
+              <a:t>count</a:t>
+            </a:r>
+            <a:r>
+              <a:rPr lang="de-AT" dirty="0" smtClean="0"/>
+              <a:t>)</a:t>
+            </a:r>
+          </a:p>
+          <a:p>
+            <a:pPr lvl="1"/>
+            <a:r>
+              <a:rPr lang="de-AT" dirty="0" smtClean="0"/>
+              <a:t>Schreibt einen </a:t>
+            </a:r>
+            <a:r>
+              <a:rPr lang="de-AT" dirty="0" err="1" smtClean="0"/>
+              <a:t>Buffer</a:t>
+            </a:r>
+            <a:r>
+              <a:rPr lang="de-AT" dirty="0" smtClean="0"/>
+              <a:t> zum Gerät</a:t>
+            </a:r>
+          </a:p>
+          <a:p>
+            <a:r>
+              <a:rPr lang="de-AT" dirty="0" err="1" smtClean="0"/>
+              <a:t>api_device_ioclt</a:t>
+            </a:r>
+            <a:r>
+              <a:rPr lang="de-AT" dirty="0" smtClean="0"/>
+              <a:t>(handle, </a:t>
+            </a:r>
+            <a:r>
+              <a:rPr lang="de-AT" dirty="0" err="1" smtClean="0"/>
+              <a:t>cmd</a:t>
+            </a:r>
+            <a:r>
+              <a:rPr lang="de-AT" dirty="0" smtClean="0"/>
+              <a:t>, arg)</a:t>
+            </a:r>
+          </a:p>
+          <a:p>
+            <a:pPr lvl="1"/>
+            <a:r>
+              <a:rPr lang="de-AT" dirty="0" smtClean="0"/>
+              <a:t>Schickt einen gerätespezifischen Befehl</a:t>
+            </a:r>
+          </a:p>
+        </p:txBody>
+      </p:sp>
     </p:spTree>
     <p:extLst>
       <p:ext uri="{BB962C8B-B14F-4D97-AF65-F5344CB8AC3E}">
-        <p14:creationId xmlns:p14="http://schemas.microsoft.com/office/powerpoint/2010/main" val="269939697"/>
+        <p14:creationId xmlns:p14="http://schemas.microsoft.com/office/powerpoint/2010/main" val="3237128239"/>
       </p:ext>
     </p:extLst>
   </p:cSld>

</xml_diff>